<commit_message>
polishing ppt and readme
</commit_message>
<xml_diff>
--- a/food_desert_pp.pptx
+++ b/food_desert_pp.pptx
@@ -5,27 +5,26 @@
     <p:sldMasterId id="2147483648" r:id="rId1"/>
   </p:sldMasterIdLst>
   <p:notesMasterIdLst>
-    <p:notesMasterId r:id="rId20"/>
+    <p:notesMasterId r:id="rId19"/>
   </p:notesMasterIdLst>
   <p:sldIdLst>
     <p:sldId id="256" r:id="rId2"/>
     <p:sldId id="257" r:id="rId3"/>
-    <p:sldId id="269" r:id="rId4"/>
-    <p:sldId id="265" r:id="rId5"/>
-    <p:sldId id="260" r:id="rId6"/>
-    <p:sldId id="272" r:id="rId7"/>
-    <p:sldId id="268" r:id="rId8"/>
-    <p:sldId id="263" r:id="rId9"/>
-    <p:sldId id="278" r:id="rId10"/>
-    <p:sldId id="259" r:id="rId11"/>
-    <p:sldId id="273" r:id="rId12"/>
-    <p:sldId id="274" r:id="rId13"/>
-    <p:sldId id="275" r:id="rId14"/>
-    <p:sldId id="276" r:id="rId15"/>
-    <p:sldId id="277" r:id="rId16"/>
-    <p:sldId id="258" r:id="rId17"/>
-    <p:sldId id="271" r:id="rId18"/>
-    <p:sldId id="279" r:id="rId19"/>
+    <p:sldId id="265" r:id="rId4"/>
+    <p:sldId id="260" r:id="rId5"/>
+    <p:sldId id="272" r:id="rId6"/>
+    <p:sldId id="268" r:id="rId7"/>
+    <p:sldId id="263" r:id="rId8"/>
+    <p:sldId id="280" r:id="rId9"/>
+    <p:sldId id="281" r:id="rId10"/>
+    <p:sldId id="282" r:id="rId11"/>
+    <p:sldId id="283" r:id="rId12"/>
+    <p:sldId id="284" r:id="rId13"/>
+    <p:sldId id="285" r:id="rId14"/>
+    <p:sldId id="278" r:id="rId15"/>
+    <p:sldId id="258" r:id="rId16"/>
+    <p:sldId id="271" r:id="rId17"/>
+    <p:sldId id="279" r:id="rId18"/>
   </p:sldIdLst>
   <p:sldSz cx="12192000" cy="6858000"/>
   <p:notesSz cx="6858000" cy="9144000"/>
@@ -560,6 +559,258 @@
 </p:notes>
 </file>
 
+<file path=ppt/notesSlides/notesSlide10.xml><?xml version="1.0" encoding="utf-8"?>
+<p:notes xmlns:a="http://schemas.openxmlformats.org/drawingml/2006/main" xmlns:r="http://schemas.openxmlformats.org/officeDocument/2006/relationships" xmlns:p="http://schemas.openxmlformats.org/presentationml/2006/main">
+  <p:cSld>
+    <p:spTree>
+      <p:nvGrpSpPr>
+        <p:cNvPr id="1" name=""/>
+        <p:cNvGrpSpPr/>
+        <p:nvPr/>
+      </p:nvGrpSpPr>
+      <p:grpSpPr>
+        <a:xfrm>
+          <a:off x="0" y="0"/>
+          <a:ext cx="0" cy="0"/>
+          <a:chOff x="0" y="0"/>
+          <a:chExt cx="0" cy="0"/>
+        </a:xfrm>
+      </p:grpSpPr>
+      <p:sp>
+        <p:nvSpPr>
+          <p:cNvPr id="2" name="Slide Image Placeholder 1"/>
+          <p:cNvSpPr>
+            <a:spLocks noGrp="1" noRot="1" noChangeAspect="1"/>
+          </p:cNvSpPr>
+          <p:nvPr>
+            <p:ph type="sldImg"/>
+          </p:nvPr>
+        </p:nvSpPr>
+        <p:spPr/>
+      </p:sp>
+      <p:sp>
+        <p:nvSpPr>
+          <p:cNvPr id="3" name="Notes Placeholder 2"/>
+          <p:cNvSpPr>
+            <a:spLocks noGrp="1"/>
+          </p:cNvSpPr>
+          <p:nvPr>
+            <p:ph type="body" idx="1"/>
+          </p:nvPr>
+        </p:nvSpPr>
+        <p:spPr/>
+        <p:txBody>
+          <a:bodyPr/>
+          <a:lstStyle/>
+          <a:p>
+            <a:endParaRPr lang="en-US" dirty="0"/>
+          </a:p>
+        </p:txBody>
+      </p:sp>
+      <p:sp>
+        <p:nvSpPr>
+          <p:cNvPr id="4" name="Slide Number Placeholder 3"/>
+          <p:cNvSpPr>
+            <a:spLocks noGrp="1"/>
+          </p:cNvSpPr>
+          <p:nvPr>
+            <p:ph type="sldNum" sz="quarter" idx="5"/>
+          </p:nvPr>
+        </p:nvSpPr>
+        <p:spPr/>
+        <p:txBody>
+          <a:bodyPr/>
+          <a:lstStyle/>
+          <a:p>
+            <a:fld id="{215B2E5D-87C1-E14D-8640-5E66DB7EFB6C}" type="slidenum">
+              <a:rPr lang="en-US" smtClean="0"/>
+              <a:t>13</a:t>
+            </a:fld>
+            <a:endParaRPr lang="en-US"/>
+          </a:p>
+        </p:txBody>
+      </p:sp>
+    </p:spTree>
+    <p:extLst>
+      <p:ext uri="{BB962C8B-B14F-4D97-AF65-F5344CB8AC3E}">
+        <p14:creationId xmlns:p14="http://schemas.microsoft.com/office/powerpoint/2010/main" val="737331624"/>
+      </p:ext>
+    </p:extLst>
+  </p:cSld>
+  <p:clrMapOvr>
+    <a:masterClrMapping/>
+  </p:clrMapOvr>
+</p:notes>
+</file>
+
+<file path=ppt/notesSlides/notesSlide11.xml><?xml version="1.0" encoding="utf-8"?>
+<p:notes xmlns:a="http://schemas.openxmlformats.org/drawingml/2006/main" xmlns:r="http://schemas.openxmlformats.org/officeDocument/2006/relationships" xmlns:p="http://schemas.openxmlformats.org/presentationml/2006/main">
+  <p:cSld>
+    <p:spTree>
+      <p:nvGrpSpPr>
+        <p:cNvPr id="1" name=""/>
+        <p:cNvGrpSpPr/>
+        <p:nvPr/>
+      </p:nvGrpSpPr>
+      <p:grpSpPr>
+        <a:xfrm>
+          <a:off x="0" y="0"/>
+          <a:ext cx="0" cy="0"/>
+          <a:chOff x="0" y="0"/>
+          <a:chExt cx="0" cy="0"/>
+        </a:xfrm>
+      </p:grpSpPr>
+      <p:sp>
+        <p:nvSpPr>
+          <p:cNvPr id="2" name="Slide Image Placeholder 1"/>
+          <p:cNvSpPr>
+            <a:spLocks noGrp="1" noRot="1" noChangeAspect="1"/>
+          </p:cNvSpPr>
+          <p:nvPr>
+            <p:ph type="sldImg"/>
+          </p:nvPr>
+        </p:nvSpPr>
+        <p:spPr/>
+      </p:sp>
+      <p:sp>
+        <p:nvSpPr>
+          <p:cNvPr id="3" name="Notes Placeholder 2"/>
+          <p:cNvSpPr>
+            <a:spLocks noGrp="1"/>
+          </p:cNvSpPr>
+          <p:nvPr>
+            <p:ph type="body" idx="1"/>
+          </p:nvPr>
+        </p:nvSpPr>
+        <p:spPr/>
+        <p:txBody>
+          <a:bodyPr/>
+          <a:lstStyle/>
+          <a:p>
+            <a:endParaRPr lang="en-US" dirty="0"/>
+          </a:p>
+        </p:txBody>
+      </p:sp>
+      <p:sp>
+        <p:nvSpPr>
+          <p:cNvPr id="4" name="Slide Number Placeholder 3"/>
+          <p:cNvSpPr>
+            <a:spLocks noGrp="1"/>
+          </p:cNvSpPr>
+          <p:nvPr>
+            <p:ph type="sldNum" sz="quarter" idx="5"/>
+          </p:nvPr>
+        </p:nvSpPr>
+        <p:spPr/>
+        <p:txBody>
+          <a:bodyPr/>
+          <a:lstStyle/>
+          <a:p>
+            <a:fld id="{215B2E5D-87C1-E14D-8640-5E66DB7EFB6C}" type="slidenum">
+              <a:rPr lang="en-US" smtClean="0"/>
+              <a:t>14</a:t>
+            </a:fld>
+            <a:endParaRPr lang="en-US"/>
+          </a:p>
+        </p:txBody>
+      </p:sp>
+    </p:spTree>
+    <p:extLst>
+      <p:ext uri="{BB962C8B-B14F-4D97-AF65-F5344CB8AC3E}">
+        <p14:creationId xmlns:p14="http://schemas.microsoft.com/office/powerpoint/2010/main" val="1561530210"/>
+      </p:ext>
+    </p:extLst>
+  </p:cSld>
+  <p:clrMapOvr>
+    <a:masterClrMapping/>
+  </p:clrMapOvr>
+</p:notes>
+</file>
+
+<file path=ppt/notesSlides/notesSlide12.xml><?xml version="1.0" encoding="utf-8"?>
+<p:notes xmlns:a="http://schemas.openxmlformats.org/drawingml/2006/main" xmlns:r="http://schemas.openxmlformats.org/officeDocument/2006/relationships" xmlns:p="http://schemas.openxmlformats.org/presentationml/2006/main">
+  <p:cSld>
+    <p:spTree>
+      <p:nvGrpSpPr>
+        <p:cNvPr id="1" name=""/>
+        <p:cNvGrpSpPr/>
+        <p:nvPr/>
+      </p:nvGrpSpPr>
+      <p:grpSpPr>
+        <a:xfrm>
+          <a:off x="0" y="0"/>
+          <a:ext cx="0" cy="0"/>
+          <a:chOff x="0" y="0"/>
+          <a:chExt cx="0" cy="0"/>
+        </a:xfrm>
+      </p:grpSpPr>
+      <p:sp>
+        <p:nvSpPr>
+          <p:cNvPr id="2" name="Slide Image Placeholder 1"/>
+          <p:cNvSpPr>
+            <a:spLocks noGrp="1" noRot="1" noChangeAspect="1"/>
+          </p:cNvSpPr>
+          <p:nvPr>
+            <p:ph type="sldImg"/>
+          </p:nvPr>
+        </p:nvSpPr>
+        <p:spPr/>
+      </p:sp>
+      <p:sp>
+        <p:nvSpPr>
+          <p:cNvPr id="3" name="Notes Placeholder 2"/>
+          <p:cNvSpPr>
+            <a:spLocks noGrp="1"/>
+          </p:cNvSpPr>
+          <p:nvPr>
+            <p:ph type="body" idx="1"/>
+          </p:nvPr>
+        </p:nvSpPr>
+        <p:spPr/>
+        <p:txBody>
+          <a:bodyPr/>
+          <a:lstStyle/>
+          <a:p>
+            <a:endParaRPr lang="en-US" dirty="0"/>
+          </a:p>
+        </p:txBody>
+      </p:sp>
+      <p:sp>
+        <p:nvSpPr>
+          <p:cNvPr id="4" name="Slide Number Placeholder 3"/>
+          <p:cNvSpPr>
+            <a:spLocks noGrp="1"/>
+          </p:cNvSpPr>
+          <p:nvPr>
+            <p:ph type="sldNum" sz="quarter" idx="5"/>
+          </p:nvPr>
+        </p:nvSpPr>
+        <p:spPr/>
+        <p:txBody>
+          <a:bodyPr/>
+          <a:lstStyle/>
+          <a:p>
+            <a:fld id="{215B2E5D-87C1-E14D-8640-5E66DB7EFB6C}" type="slidenum">
+              <a:rPr lang="en-US" smtClean="0"/>
+              <a:t>15</a:t>
+            </a:fld>
+            <a:endParaRPr lang="en-US"/>
+          </a:p>
+        </p:txBody>
+      </p:sp>
+    </p:spTree>
+    <p:extLst>
+      <p:ext uri="{BB962C8B-B14F-4D97-AF65-F5344CB8AC3E}">
+        <p14:creationId xmlns:p14="http://schemas.microsoft.com/office/powerpoint/2010/main" val="923823559"/>
+      </p:ext>
+    </p:extLst>
+  </p:cSld>
+  <p:clrMapOvr>
+    <a:masterClrMapping/>
+  </p:clrMapOvr>
+</p:notes>
+</file>
+
 <file path=ppt/notesSlides/notesSlide2.xml><?xml version="1.0" encoding="utf-8"?>
 <p:notes xmlns:a="http://schemas.openxmlformats.org/drawingml/2006/main" xmlns:r="http://schemas.openxmlformats.org/officeDocument/2006/relationships" xmlns:p="http://schemas.openxmlformats.org/presentationml/2006/main">
   <p:cSld>
@@ -787,7 +1038,71 @@
           <a:bodyPr/>
           <a:lstStyle/>
           <a:p>
+            <a:r>
+              <a:rPr lang="en-US" dirty="0"/>
+              <a:t>-According to a study in the American Journal of Preventive Medicine, wealthier neighborhoods have over three times as many supermarkets as lower income neighborhoods. Keep in mind that this is nation-wide, not Nashville specifically.</a:t>
+            </a:r>
+          </a:p>
+          <a:p>
             <a:endParaRPr lang="en-US" dirty="0"/>
+          </a:p>
+          <a:p>
+            <a:r>
+              <a:rPr lang="en-US" dirty="0"/>
+              <a:t>-Findings from this study led researchers to speculate that the migration of supermarkets to suburbs and the lack of transportation available to low-income communities are contributing to malnutrition amongst poorer communities</a:t>
+            </a:r>
+          </a:p>
+          <a:p>
+            <a:endParaRPr lang="en-US" dirty="0"/>
+          </a:p>
+          <a:p>
+            <a:pPr marL="0" marR="0" lvl="0" indent="0" algn="l" defTabSz="914400" rtl="0" eaLnBrk="1" fontAlgn="auto" latinLnBrk="0" hangingPunct="1">
+              <a:lnSpc>
+                <a:spcPct val="100000"/>
+              </a:lnSpc>
+              <a:spcBef>
+                <a:spcPts val="0"/>
+              </a:spcBef>
+              <a:spcAft>
+                <a:spcPts val="0"/>
+              </a:spcAft>
+              <a:buClrTx/>
+              <a:buSzTx/>
+              <a:buFontTx/>
+              <a:buNone/>
+              <a:tabLst/>
+              <a:defRPr/>
+            </a:pPr>
+            <a:r>
+              <a:rPr lang="en-US" dirty="0"/>
+              <a:t>-”Premature death due to cancer and cardiovascular disease is also greater for African-American, White, and Latino communities where there is greater imbalance of food choices.” (Gallagher, 2006)</a:t>
+            </a:r>
+          </a:p>
+          <a:p>
+            <a:endParaRPr lang="en-US" dirty="0"/>
+          </a:p>
+          <a:p>
+            <a:pPr marL="0" marR="0" lvl="0" indent="0" algn="l" defTabSz="914400" rtl="0" eaLnBrk="1" fontAlgn="auto" latinLnBrk="0" hangingPunct="1">
+              <a:lnSpc>
+                <a:spcPct val="100000"/>
+              </a:lnSpc>
+              <a:spcBef>
+                <a:spcPts val="0"/>
+              </a:spcBef>
+              <a:spcAft>
+                <a:spcPts val="0"/>
+              </a:spcAft>
+              <a:buClrTx/>
+              <a:buSzTx/>
+              <a:buFontTx/>
+              <a:buNone/>
+              <a:tabLst/>
+              <a:defRPr/>
+            </a:pPr>
+            <a:r>
+              <a:rPr lang="en-US" dirty="0"/>
+              <a:t>A study in Chicago demonstrated that African-Americans are the most disadvantaged in regards to access to healthy food choices, and travel the furthest on average to grocery stores [in Chicago]. (Gallagher, 2006)</a:t>
+            </a:r>
           </a:p>
         </p:txBody>
       </p:sp>
@@ -817,7 +1132,7 @@
     </p:spTree>
     <p:extLst>
       <p:ext uri="{BB962C8B-B14F-4D97-AF65-F5344CB8AC3E}">
-        <p14:creationId xmlns:p14="http://schemas.microsoft.com/office/powerpoint/2010/main" val="1102780649"/>
+        <p14:creationId xmlns:p14="http://schemas.microsoft.com/office/powerpoint/2010/main" val="2806229823"/>
       </p:ext>
     </p:extLst>
   </p:cSld>
@@ -871,24 +1186,6 @@
           <a:bodyPr/>
           <a:lstStyle/>
           <a:p>
-            <a:r>
-              <a:rPr lang="en-US" dirty="0"/>
-              <a:t>-According to a study in the American Journal of Preventive Medicine, wealthier neighborhoods have over three times as many supermarkets as lower income neighborhoods</a:t>
-            </a:r>
-          </a:p>
-          <a:p>
-            <a:endParaRPr lang="en-US" dirty="0"/>
-          </a:p>
-          <a:p>
-            <a:r>
-              <a:rPr lang="en-US" dirty="0"/>
-              <a:t>-Findings from this study led researchers to speculate that the migration of supermarkets to suburbs and the lack of transportation available to low-income communities are contributing to malnutrition among the poor.</a:t>
-            </a:r>
-          </a:p>
-          <a:p>
-            <a:endParaRPr lang="en-US" dirty="0"/>
-          </a:p>
-          <a:p>
             <a:pPr marL="0" marR="0" lvl="0" indent="0" algn="l" defTabSz="914400" rtl="0" eaLnBrk="1" fontAlgn="auto" latinLnBrk="0" hangingPunct="1">
               <a:lnSpc>
                 <a:spcPct val="100000"/>
@@ -908,7 +1205,7 @@
             </a:pPr>
             <a:r>
               <a:rPr lang="en-US" dirty="0"/>
-              <a:t>-”Premature death due to cancer and cardiovascular disease is also greater for African-American, White, and Latino communities where there is greater imbalance of food choices.” (Gallagher, 2006)</a:t>
+              <a:t>Piggly Wiggly was closest grocery store. After closer, no choice but to drive ~15-20 minutes to Publix or Kroger, dependent on traffic.</a:t>
             </a:r>
           </a:p>
           <a:p>
@@ -934,7 +1231,7 @@
             </a:pPr>
             <a:r>
               <a:rPr lang="en-US" dirty="0"/>
-              <a:t>A study in Chicago demonstrated that African-Americans are the most disadvantaged in regards to access to healthy food choices, and travel the furthest on average to grocery stores [in Chicago]. (Gallagher, 2006)</a:t>
+              <a:t>I am a registered nurse, and public health in all its forms is a big interest of mine. Public health is an important subject matter to everyone in a community.</a:t>
             </a:r>
           </a:p>
           <a:p>
@@ -968,7 +1265,7 @@
     </p:spTree>
     <p:extLst>
       <p:ext uri="{BB962C8B-B14F-4D97-AF65-F5344CB8AC3E}">
-        <p14:creationId xmlns:p14="http://schemas.microsoft.com/office/powerpoint/2010/main" val="2806229823"/>
+        <p14:creationId xmlns:p14="http://schemas.microsoft.com/office/powerpoint/2010/main" val="1679474066"/>
       </p:ext>
     </p:extLst>
   </p:cSld>
@@ -1022,56 +1319,85 @@
           <a:bodyPr/>
           <a:lstStyle/>
           <a:p>
-            <a:pPr marL="0" marR="0" lvl="0" indent="0" algn="l" defTabSz="914400" rtl="0" eaLnBrk="1" fontAlgn="auto" latinLnBrk="0" hangingPunct="1">
-              <a:lnSpc>
-                <a:spcPct val="100000"/>
-              </a:lnSpc>
-              <a:spcBef>
-                <a:spcPts val="0"/>
-              </a:spcBef>
-              <a:spcAft>
-                <a:spcPts val="0"/>
-              </a:spcAft>
-              <a:buClrTx/>
-              <a:buSzTx/>
-              <a:buFontTx/>
-              <a:buNone/>
-              <a:tabLst/>
-              <a:defRPr/>
-            </a:pPr>
             <a:r>
               <a:rPr lang="en-US" dirty="0"/>
-              <a:t>Piggly Wiggly was closest grocery store. After closer, no choice but to drive ~15-20 minutes to Publix or Kroger, dependent on traffic.</a:t>
+              <a:t>I quickly discovered that my analysis will have a few limitations.</a:t>
             </a:r>
           </a:p>
           <a:p>
             <a:endParaRPr lang="en-US" dirty="0"/>
           </a:p>
           <a:p>
-            <a:pPr marL="0" marR="0" lvl="0" indent="0" algn="l" defTabSz="914400" rtl="0" eaLnBrk="1" fontAlgn="auto" latinLnBrk="0" hangingPunct="1">
-              <a:lnSpc>
-                <a:spcPct val="100000"/>
-              </a:lnSpc>
-              <a:spcBef>
-                <a:spcPts val="0"/>
-              </a:spcBef>
-              <a:spcAft>
-                <a:spcPts val="0"/>
-              </a:spcAft>
-              <a:buClrTx/>
-              <a:buSzTx/>
-              <a:buFontTx/>
-              <a:buNone/>
-              <a:tabLst/>
-              <a:defRPr/>
-            </a:pPr>
             <a:r>
               <a:rPr lang="en-US" dirty="0"/>
-              <a:t>I am a registered nurse, and public health in all its forms is a big interest of mine</a:t>
+              <a:t>Most of these limitations surround API nuances</a:t>
+            </a:r>
+          </a:p>
+          <a:p>
+            <a:r>
+              <a:rPr lang="en-US" dirty="0"/>
+              <a:t>	* Google Places API limits queries to 60 results</a:t>
+            </a:r>
+          </a:p>
+          <a:p>
+            <a:r>
+              <a:rPr lang="en-US" dirty="0"/>
+              <a:t>	* Results differ depending on size of search area</a:t>
+            </a:r>
+          </a:p>
+          <a:p>
+            <a:r>
+              <a:rPr lang="en-US" dirty="0"/>
+              <a:t>		* ‘zoom in’ on google maps while doing a search</a:t>
+            </a:r>
+          </a:p>
+          <a:p>
+            <a:r>
+              <a:rPr lang="en-US" dirty="0"/>
+              <a:t>	* Duplicates are a given when searching amongst adjacent zip codes</a:t>
             </a:r>
           </a:p>
           <a:p>
             <a:endParaRPr lang="en-US" dirty="0"/>
+          </a:p>
+          <a:p>
+            <a:r>
+              <a:rPr lang="en-US" dirty="0"/>
+              <a:t>Too much subjectivity when categorizing stores</a:t>
+            </a:r>
+          </a:p>
+          <a:p>
+            <a:r>
+              <a:rPr lang="en-US" dirty="0"/>
+              <a:t>	* one API parameter is establishment type</a:t>
+            </a:r>
+          </a:p>
+          <a:p>
+            <a:r>
+              <a:rPr lang="en-US" dirty="0"/>
+              <a:t>		* parameter set for query, but results still not perfect</a:t>
+            </a:r>
+          </a:p>
+          <a:p>
+            <a:r>
+              <a:rPr lang="en-US" dirty="0"/>
+              <a:t>		* required manual filtering</a:t>
+            </a:r>
+          </a:p>
+          <a:p>
+            <a:r>
+              <a:rPr lang="en-US" dirty="0"/>
+              <a:t>	* many results in grocery query too ambiguous, potentially fitting other categories more closely</a:t>
+            </a:r>
+          </a:p>
+          <a:p>
+            <a:endParaRPr lang="en-US" dirty="0"/>
+          </a:p>
+          <a:p>
+            <a:r>
+              <a:rPr lang="en-US" dirty="0"/>
+              <a:t>This analysis did not look at data other than number of grocery stores and the relationship to chronic disease.</a:t>
+            </a:r>
           </a:p>
         </p:txBody>
       </p:sp>
@@ -1092,7 +1418,7 @@
           <a:p>
             <a:fld id="{215B2E5D-87C1-E14D-8640-5E66DB7EFB6C}" type="slidenum">
               <a:rPr lang="en-US" smtClean="0"/>
-              <a:t>5</a:t>
+              <a:t>6</a:t>
             </a:fld>
             <a:endParaRPr lang="en-US"/>
           </a:p>
@@ -1101,7 +1427,7 @@
     </p:spTree>
     <p:extLst>
       <p:ext uri="{BB962C8B-B14F-4D97-AF65-F5344CB8AC3E}">
-        <p14:creationId xmlns:p14="http://schemas.microsoft.com/office/powerpoint/2010/main" val="1679474066"/>
+        <p14:creationId xmlns:p14="http://schemas.microsoft.com/office/powerpoint/2010/main" val="2309547921"/>
       </p:ext>
     </p:extLst>
   </p:cSld>
@@ -1155,7 +1481,10 @@
           <a:bodyPr/>
           <a:lstStyle/>
           <a:p>
-            <a:endParaRPr lang="en-US" dirty="0"/>
+            <a:r>
+              <a:rPr lang="en-US" dirty="0"/>
+              <a:t>Most of the following scatter plots demonstrate a weak relationship. There are some interesting findings however.</a:t>
+            </a:r>
           </a:p>
         </p:txBody>
       </p:sp>
@@ -1176,7 +1505,7 @@
           <a:p>
             <a:fld id="{215B2E5D-87C1-E14D-8640-5E66DB7EFB6C}" type="slidenum">
               <a:rPr lang="en-US" smtClean="0"/>
-              <a:t>16</a:t>
+              <a:t>8</a:t>
             </a:fld>
             <a:endParaRPr lang="en-US"/>
           </a:p>
@@ -1185,7 +1514,262 @@
     </p:spTree>
     <p:extLst>
       <p:ext uri="{BB962C8B-B14F-4D97-AF65-F5344CB8AC3E}">
-        <p14:creationId xmlns:p14="http://schemas.microsoft.com/office/powerpoint/2010/main" val="923823559"/>
+        <p14:creationId xmlns:p14="http://schemas.microsoft.com/office/powerpoint/2010/main" val="1297237968"/>
+      </p:ext>
+    </p:extLst>
+  </p:cSld>
+  <p:clrMapOvr>
+    <a:masterClrMapping/>
+  </p:clrMapOvr>
+</p:notes>
+</file>
+
+<file path=ppt/notesSlides/notesSlide7.xml><?xml version="1.0" encoding="utf-8"?>
+<p:notes xmlns:a="http://schemas.openxmlformats.org/drawingml/2006/main" xmlns:r="http://schemas.openxmlformats.org/officeDocument/2006/relationships" xmlns:p="http://schemas.openxmlformats.org/presentationml/2006/main">
+  <p:cSld>
+    <p:spTree>
+      <p:nvGrpSpPr>
+        <p:cNvPr id="1" name=""/>
+        <p:cNvGrpSpPr/>
+        <p:nvPr/>
+      </p:nvGrpSpPr>
+      <p:grpSpPr>
+        <a:xfrm>
+          <a:off x="0" y="0"/>
+          <a:ext cx="0" cy="0"/>
+          <a:chOff x="0" y="0"/>
+          <a:chExt cx="0" cy="0"/>
+        </a:xfrm>
+      </p:grpSpPr>
+      <p:sp>
+        <p:nvSpPr>
+          <p:cNvPr id="2" name="Slide Image Placeholder 1"/>
+          <p:cNvSpPr>
+            <a:spLocks noGrp="1" noRot="1" noChangeAspect="1"/>
+          </p:cNvSpPr>
+          <p:nvPr>
+            <p:ph type="sldImg"/>
+          </p:nvPr>
+        </p:nvSpPr>
+        <p:spPr/>
+      </p:sp>
+      <p:sp>
+        <p:nvSpPr>
+          <p:cNvPr id="3" name="Notes Placeholder 2"/>
+          <p:cNvSpPr>
+            <a:spLocks noGrp="1"/>
+          </p:cNvSpPr>
+          <p:nvPr>
+            <p:ph type="body" idx="1"/>
+          </p:nvPr>
+        </p:nvSpPr>
+        <p:spPr/>
+        <p:txBody>
+          <a:bodyPr/>
+          <a:lstStyle/>
+          <a:p>
+            <a:endParaRPr lang="en-US" dirty="0"/>
+          </a:p>
+        </p:txBody>
+      </p:sp>
+      <p:sp>
+        <p:nvSpPr>
+          <p:cNvPr id="4" name="Slide Number Placeholder 3"/>
+          <p:cNvSpPr>
+            <a:spLocks noGrp="1"/>
+          </p:cNvSpPr>
+          <p:nvPr>
+            <p:ph type="sldNum" sz="quarter" idx="5"/>
+          </p:nvPr>
+        </p:nvSpPr>
+        <p:spPr/>
+        <p:txBody>
+          <a:bodyPr/>
+          <a:lstStyle/>
+          <a:p>
+            <a:fld id="{215B2E5D-87C1-E14D-8640-5E66DB7EFB6C}" type="slidenum">
+              <a:rPr lang="en-US" smtClean="0"/>
+              <a:t>10</a:t>
+            </a:fld>
+            <a:endParaRPr lang="en-US"/>
+          </a:p>
+        </p:txBody>
+      </p:sp>
+    </p:spTree>
+    <p:extLst>
+      <p:ext uri="{BB962C8B-B14F-4D97-AF65-F5344CB8AC3E}">
+        <p14:creationId xmlns:p14="http://schemas.microsoft.com/office/powerpoint/2010/main" val="2591177343"/>
+      </p:ext>
+    </p:extLst>
+  </p:cSld>
+  <p:clrMapOvr>
+    <a:masterClrMapping/>
+  </p:clrMapOvr>
+</p:notes>
+</file>
+
+<file path=ppt/notesSlides/notesSlide8.xml><?xml version="1.0" encoding="utf-8"?>
+<p:notes xmlns:a="http://schemas.openxmlformats.org/drawingml/2006/main" xmlns:r="http://schemas.openxmlformats.org/officeDocument/2006/relationships" xmlns:p="http://schemas.openxmlformats.org/presentationml/2006/main">
+  <p:cSld>
+    <p:spTree>
+      <p:nvGrpSpPr>
+        <p:cNvPr id="1" name=""/>
+        <p:cNvGrpSpPr/>
+        <p:nvPr/>
+      </p:nvGrpSpPr>
+      <p:grpSpPr>
+        <a:xfrm>
+          <a:off x="0" y="0"/>
+          <a:ext cx="0" cy="0"/>
+          <a:chOff x="0" y="0"/>
+          <a:chExt cx="0" cy="0"/>
+        </a:xfrm>
+      </p:grpSpPr>
+      <p:sp>
+        <p:nvSpPr>
+          <p:cNvPr id="2" name="Slide Image Placeholder 1"/>
+          <p:cNvSpPr>
+            <a:spLocks noGrp="1" noRot="1" noChangeAspect="1"/>
+          </p:cNvSpPr>
+          <p:nvPr>
+            <p:ph type="sldImg"/>
+          </p:nvPr>
+        </p:nvSpPr>
+        <p:spPr/>
+      </p:sp>
+      <p:sp>
+        <p:nvSpPr>
+          <p:cNvPr id="3" name="Notes Placeholder 2"/>
+          <p:cNvSpPr>
+            <a:spLocks noGrp="1"/>
+          </p:cNvSpPr>
+          <p:nvPr>
+            <p:ph type="body" idx="1"/>
+          </p:nvPr>
+        </p:nvSpPr>
+        <p:spPr/>
+        <p:txBody>
+          <a:bodyPr/>
+          <a:lstStyle/>
+          <a:p>
+            <a:r>
+              <a:rPr lang="en-US" dirty="0"/>
+              <a:t>High cholesterol seems to have the highest prevalence out of all diseases examined. The positive trend line works against my hypothesis however, so further analysis would benefit from looking at other metrics.</a:t>
+            </a:r>
+          </a:p>
+        </p:txBody>
+      </p:sp>
+      <p:sp>
+        <p:nvSpPr>
+          <p:cNvPr id="4" name="Slide Number Placeholder 3"/>
+          <p:cNvSpPr>
+            <a:spLocks noGrp="1"/>
+          </p:cNvSpPr>
+          <p:nvPr>
+            <p:ph type="sldNum" sz="quarter" idx="5"/>
+          </p:nvPr>
+        </p:nvSpPr>
+        <p:spPr/>
+        <p:txBody>
+          <a:bodyPr/>
+          <a:lstStyle/>
+          <a:p>
+            <a:fld id="{215B2E5D-87C1-E14D-8640-5E66DB7EFB6C}" type="slidenum">
+              <a:rPr lang="en-US" smtClean="0"/>
+              <a:t>11</a:t>
+            </a:fld>
+            <a:endParaRPr lang="en-US"/>
+          </a:p>
+        </p:txBody>
+      </p:sp>
+    </p:spTree>
+    <p:extLst>
+      <p:ext uri="{BB962C8B-B14F-4D97-AF65-F5344CB8AC3E}">
+        <p14:creationId xmlns:p14="http://schemas.microsoft.com/office/powerpoint/2010/main" val="66986011"/>
+      </p:ext>
+    </p:extLst>
+  </p:cSld>
+  <p:clrMapOvr>
+    <a:masterClrMapping/>
+  </p:clrMapOvr>
+</p:notes>
+</file>
+
+<file path=ppt/notesSlides/notesSlide9.xml><?xml version="1.0" encoding="utf-8"?>
+<p:notes xmlns:a="http://schemas.openxmlformats.org/drawingml/2006/main" xmlns:r="http://schemas.openxmlformats.org/officeDocument/2006/relationships" xmlns:p="http://schemas.openxmlformats.org/presentationml/2006/main">
+  <p:cSld>
+    <p:spTree>
+      <p:nvGrpSpPr>
+        <p:cNvPr id="1" name=""/>
+        <p:cNvGrpSpPr/>
+        <p:nvPr/>
+      </p:nvGrpSpPr>
+      <p:grpSpPr>
+        <a:xfrm>
+          <a:off x="0" y="0"/>
+          <a:ext cx="0" cy="0"/>
+          <a:chOff x="0" y="0"/>
+          <a:chExt cx="0" cy="0"/>
+        </a:xfrm>
+      </p:grpSpPr>
+      <p:sp>
+        <p:nvSpPr>
+          <p:cNvPr id="2" name="Slide Image Placeholder 1"/>
+          <p:cNvSpPr>
+            <a:spLocks noGrp="1" noRot="1" noChangeAspect="1"/>
+          </p:cNvSpPr>
+          <p:nvPr>
+            <p:ph type="sldImg"/>
+          </p:nvPr>
+        </p:nvSpPr>
+        <p:spPr/>
+      </p:sp>
+      <p:sp>
+        <p:nvSpPr>
+          <p:cNvPr id="3" name="Notes Placeholder 2"/>
+          <p:cNvSpPr>
+            <a:spLocks noGrp="1"/>
+          </p:cNvSpPr>
+          <p:nvPr>
+            <p:ph type="body" idx="1"/>
+          </p:nvPr>
+        </p:nvSpPr>
+        <p:spPr/>
+        <p:txBody>
+          <a:bodyPr/>
+          <a:lstStyle/>
+          <a:p>
+            <a:endParaRPr lang="en-US" dirty="0"/>
+          </a:p>
+        </p:txBody>
+      </p:sp>
+      <p:sp>
+        <p:nvSpPr>
+          <p:cNvPr id="4" name="Slide Number Placeholder 3"/>
+          <p:cNvSpPr>
+            <a:spLocks noGrp="1"/>
+          </p:cNvSpPr>
+          <p:nvPr>
+            <p:ph type="sldNum" sz="quarter" idx="5"/>
+          </p:nvPr>
+        </p:nvSpPr>
+        <p:spPr/>
+        <p:txBody>
+          <a:bodyPr/>
+          <a:lstStyle/>
+          <a:p>
+            <a:fld id="{215B2E5D-87C1-E14D-8640-5E66DB7EFB6C}" type="slidenum">
+              <a:rPr lang="en-US" smtClean="0"/>
+              <a:t>12</a:t>
+            </a:fld>
+            <a:endParaRPr lang="en-US"/>
+          </a:p>
+        </p:txBody>
+      </p:sp>
+    </p:spTree>
+    <p:extLst>
+      <p:ext uri="{BB962C8B-B14F-4D97-AF65-F5344CB8AC3E}">
+        <p14:creationId xmlns:p14="http://schemas.microsoft.com/office/powerpoint/2010/main" val="1106462944"/>
       </p:ext>
     </p:extLst>
   </p:cSld>
@@ -6953,7 +7537,7 @@
           <p:cNvPr id="2" name="Title 1">
             <a:extLst>
               <a:ext uri="{FF2B5EF4-FFF2-40B4-BE49-F238E27FC236}">
-                <a16:creationId xmlns:a16="http://schemas.microsoft.com/office/drawing/2014/main" id="{52B60D75-208D-5399-8893-8A26B6F229B4}"/>
+                <a16:creationId xmlns:a16="http://schemas.microsoft.com/office/drawing/2014/main" id="{A53EA5E4-6308-9126-C254-5D087436B290}"/>
               </a:ext>
             </a:extLst>
           </p:cNvPr>
@@ -6969,51 +7553,43 @@
           <a:bodyPr/>
           <a:lstStyle/>
           <a:p>
-            <a:r>
-              <a:rPr lang="en-US" dirty="0"/>
-              <a:t>BP scatterplot</a:t>
-            </a:r>
-          </a:p>
-        </p:txBody>
-      </p:sp>
-      <p:sp>
-        <p:nvSpPr>
-          <p:cNvPr id="3" name="Content Placeholder 2">
+            <a:endParaRPr lang="en-US"/>
+          </a:p>
+        </p:txBody>
+      </p:sp>
+      <p:pic>
+        <p:nvPicPr>
+          <p:cNvPr id="11" name="Content Placeholder 10" descr="Chart, scatter chart&#10;&#10;Description automatically generated">
             <a:extLst>
               <a:ext uri="{FF2B5EF4-FFF2-40B4-BE49-F238E27FC236}">
-                <a16:creationId xmlns:a16="http://schemas.microsoft.com/office/drawing/2014/main" id="{6958BB78-804F-3D02-73C6-8B92946505A8}"/>
+                <a16:creationId xmlns:a16="http://schemas.microsoft.com/office/drawing/2014/main" id="{46E7E5FD-2B60-AA49-6321-3B69AC253189}"/>
               </a:ext>
             </a:extLst>
           </p:cNvPr>
-          <p:cNvSpPr>
-            <a:spLocks noGrp="1"/>
-          </p:cNvSpPr>
+          <p:cNvPicPr>
+            <a:picLocks noGrp="1" noChangeAspect="1"/>
+          </p:cNvPicPr>
           <p:nvPr>
             <p:ph idx="1"/>
           </p:nvPr>
-        </p:nvSpPr>
-        <p:spPr/>
-        <p:txBody>
-          <a:bodyPr/>
-          <a:lstStyle/>
-          <a:p>
-            <a:r>
-              <a:rPr lang="en-US" dirty="0"/>
-              <a:t>+/- correlation between disease prevalence and # of grocers per zip</a:t>
-            </a:r>
-          </a:p>
-          <a:p>
-            <a:r>
-              <a:rPr lang="en-US" dirty="0"/>
-              <a:t>Scatter plot and trend line with correlation number on this slide, or next slide</a:t>
-            </a:r>
-          </a:p>
-        </p:txBody>
-      </p:sp>
+        </p:nvPicPr>
+        <p:blipFill>
+          <a:blip r:embed="rId3"/>
+          <a:stretch>
+            <a:fillRect/>
+          </a:stretch>
+        </p:blipFill>
+        <p:spPr>
+          <a:xfrm>
+            <a:off x="677334" y="0"/>
+            <a:ext cx="9678894" cy="6248400"/>
+          </a:xfrm>
+        </p:spPr>
+      </p:pic>
     </p:spTree>
     <p:extLst>
       <p:ext uri="{BB962C8B-B14F-4D97-AF65-F5344CB8AC3E}">
-        <p14:creationId xmlns:p14="http://schemas.microsoft.com/office/powerpoint/2010/main" val="2036795500"/>
+        <p14:creationId xmlns:p14="http://schemas.microsoft.com/office/powerpoint/2010/main" val="499009756"/>
       </p:ext>
     </p:extLst>
   </p:cSld>
@@ -7045,7 +7621,7 @@
           <p:cNvPr id="2" name="Title 1">
             <a:extLst>
               <a:ext uri="{FF2B5EF4-FFF2-40B4-BE49-F238E27FC236}">
-                <a16:creationId xmlns:a16="http://schemas.microsoft.com/office/drawing/2014/main" id="{52B60D75-208D-5399-8893-8A26B6F229B4}"/>
+                <a16:creationId xmlns:a16="http://schemas.microsoft.com/office/drawing/2014/main" id="{A53EA5E4-6308-9126-C254-5D087436B290}"/>
               </a:ext>
             </a:extLst>
           </p:cNvPr>
@@ -7061,51 +7637,43 @@
           <a:bodyPr/>
           <a:lstStyle/>
           <a:p>
-            <a:r>
-              <a:rPr lang="en-US" dirty="0"/>
-              <a:t>CAD scatterplot</a:t>
-            </a:r>
-          </a:p>
-        </p:txBody>
-      </p:sp>
-      <p:sp>
-        <p:nvSpPr>
-          <p:cNvPr id="3" name="Content Placeholder 2">
+            <a:endParaRPr lang="en-US"/>
+          </a:p>
+        </p:txBody>
+      </p:sp>
+      <p:pic>
+        <p:nvPicPr>
+          <p:cNvPr id="11" name="Content Placeholder 10" descr="Chart, scatter chart&#10;&#10;Description automatically generated">
             <a:extLst>
               <a:ext uri="{FF2B5EF4-FFF2-40B4-BE49-F238E27FC236}">
-                <a16:creationId xmlns:a16="http://schemas.microsoft.com/office/drawing/2014/main" id="{6958BB78-804F-3D02-73C6-8B92946505A8}"/>
+                <a16:creationId xmlns:a16="http://schemas.microsoft.com/office/drawing/2014/main" id="{5C51C8C3-D9DF-B98F-030D-0706C49F3F5B}"/>
               </a:ext>
             </a:extLst>
           </p:cNvPr>
-          <p:cNvSpPr>
-            <a:spLocks noGrp="1"/>
-          </p:cNvSpPr>
+          <p:cNvPicPr>
+            <a:picLocks noGrp="1" noChangeAspect="1"/>
+          </p:cNvPicPr>
           <p:nvPr>
             <p:ph idx="1"/>
           </p:nvPr>
-        </p:nvSpPr>
-        <p:spPr/>
-        <p:txBody>
-          <a:bodyPr/>
-          <a:lstStyle/>
-          <a:p>
-            <a:r>
-              <a:rPr lang="en-US" dirty="0"/>
-              <a:t>+/- correlation between disease prevalence and # of grocers per zip</a:t>
-            </a:r>
-          </a:p>
-          <a:p>
-            <a:r>
-              <a:rPr lang="en-US" dirty="0"/>
-              <a:t>Scatter plot and trend line with correlation number on this slide, or next slide</a:t>
-            </a:r>
-          </a:p>
-        </p:txBody>
-      </p:sp>
+        </p:nvPicPr>
+        <p:blipFill>
+          <a:blip r:embed="rId3"/>
+          <a:stretch>
+            <a:fillRect/>
+          </a:stretch>
+        </p:blipFill>
+        <p:spPr>
+          <a:xfrm>
+            <a:off x="677334" y="0"/>
+            <a:ext cx="9678894" cy="6248400"/>
+          </a:xfrm>
+        </p:spPr>
+      </p:pic>
     </p:spTree>
     <p:extLst>
       <p:ext uri="{BB962C8B-B14F-4D97-AF65-F5344CB8AC3E}">
-        <p14:creationId xmlns:p14="http://schemas.microsoft.com/office/powerpoint/2010/main" val="2166147582"/>
+        <p14:creationId xmlns:p14="http://schemas.microsoft.com/office/powerpoint/2010/main" val="502227334"/>
       </p:ext>
     </p:extLst>
   </p:cSld>
@@ -7137,7 +7705,7 @@
           <p:cNvPr id="2" name="Title 1">
             <a:extLst>
               <a:ext uri="{FF2B5EF4-FFF2-40B4-BE49-F238E27FC236}">
-                <a16:creationId xmlns:a16="http://schemas.microsoft.com/office/drawing/2014/main" id="{52B60D75-208D-5399-8893-8A26B6F229B4}"/>
+                <a16:creationId xmlns:a16="http://schemas.microsoft.com/office/drawing/2014/main" id="{A53EA5E4-6308-9126-C254-5D087436B290}"/>
               </a:ext>
             </a:extLst>
           </p:cNvPr>
@@ -7153,51 +7721,43 @@
           <a:bodyPr/>
           <a:lstStyle/>
           <a:p>
-            <a:r>
-              <a:rPr lang="en-US" dirty="0"/>
-              <a:t>DM scatterplot</a:t>
-            </a:r>
-          </a:p>
-        </p:txBody>
-      </p:sp>
-      <p:sp>
-        <p:nvSpPr>
-          <p:cNvPr id="3" name="Content Placeholder 2">
+            <a:endParaRPr lang="en-US"/>
+          </a:p>
+        </p:txBody>
+      </p:sp>
+      <p:pic>
+        <p:nvPicPr>
+          <p:cNvPr id="11" name="Content Placeholder 10" descr="Chart, scatter chart&#10;&#10;Description automatically generated">
             <a:extLst>
               <a:ext uri="{FF2B5EF4-FFF2-40B4-BE49-F238E27FC236}">
-                <a16:creationId xmlns:a16="http://schemas.microsoft.com/office/drawing/2014/main" id="{6958BB78-804F-3D02-73C6-8B92946505A8}"/>
+                <a16:creationId xmlns:a16="http://schemas.microsoft.com/office/drawing/2014/main" id="{B9720362-136D-9DAE-E66A-CC2E7391DB9F}"/>
               </a:ext>
             </a:extLst>
           </p:cNvPr>
-          <p:cNvSpPr>
-            <a:spLocks noGrp="1"/>
-          </p:cNvSpPr>
+          <p:cNvPicPr>
+            <a:picLocks noGrp="1" noChangeAspect="1"/>
+          </p:cNvPicPr>
           <p:nvPr>
             <p:ph idx="1"/>
           </p:nvPr>
-        </p:nvSpPr>
-        <p:spPr/>
-        <p:txBody>
-          <a:bodyPr/>
-          <a:lstStyle/>
-          <a:p>
-            <a:r>
-              <a:rPr lang="en-US" dirty="0"/>
-              <a:t>+/- correlation between disease prevalence and # of grocers per zip</a:t>
-            </a:r>
-          </a:p>
-          <a:p>
-            <a:r>
-              <a:rPr lang="en-US" dirty="0"/>
-              <a:t>Scatter plot and trend line with correlation number on this slide, or next slide</a:t>
-            </a:r>
-          </a:p>
-        </p:txBody>
-      </p:sp>
+        </p:nvPicPr>
+        <p:blipFill>
+          <a:blip r:embed="rId3"/>
+          <a:stretch>
+            <a:fillRect/>
+          </a:stretch>
+        </p:blipFill>
+        <p:spPr>
+          <a:xfrm>
+            <a:off x="677334" y="0"/>
+            <a:ext cx="9678894" cy="6248400"/>
+          </a:xfrm>
+        </p:spPr>
+      </p:pic>
     </p:spTree>
     <p:extLst>
       <p:ext uri="{BB962C8B-B14F-4D97-AF65-F5344CB8AC3E}">
-        <p14:creationId xmlns:p14="http://schemas.microsoft.com/office/powerpoint/2010/main" val="2236692099"/>
+        <p14:creationId xmlns:p14="http://schemas.microsoft.com/office/powerpoint/2010/main" val="3473258192"/>
       </p:ext>
     </p:extLst>
   </p:cSld>
@@ -7229,7 +7789,7 @@
           <p:cNvPr id="2" name="Title 1">
             <a:extLst>
               <a:ext uri="{FF2B5EF4-FFF2-40B4-BE49-F238E27FC236}">
-                <a16:creationId xmlns:a16="http://schemas.microsoft.com/office/drawing/2014/main" id="{52B60D75-208D-5399-8893-8A26B6F229B4}"/>
+                <a16:creationId xmlns:a16="http://schemas.microsoft.com/office/drawing/2014/main" id="{A53EA5E4-6308-9126-C254-5D087436B290}"/>
               </a:ext>
             </a:extLst>
           </p:cNvPr>
@@ -7245,59 +7805,43 @@
           <a:bodyPr/>
           <a:lstStyle/>
           <a:p>
-            <a:r>
-              <a:rPr lang="en-US" dirty="0"/>
-              <a:t>High </a:t>
-            </a:r>
-            <a:r>
-              <a:rPr lang="en-US" dirty="0" err="1"/>
-              <a:t>chol</a:t>
-            </a:r>
-            <a:r>
-              <a:rPr lang="en-US" dirty="0"/>
-              <a:t> scatterplot</a:t>
-            </a:r>
-          </a:p>
-        </p:txBody>
-      </p:sp>
-      <p:sp>
-        <p:nvSpPr>
-          <p:cNvPr id="3" name="Content Placeholder 2">
+            <a:endParaRPr lang="en-US"/>
+          </a:p>
+        </p:txBody>
+      </p:sp>
+      <p:pic>
+        <p:nvPicPr>
+          <p:cNvPr id="11" name="Content Placeholder 10" descr="Chart, scatter chart&#10;&#10;Description automatically generated">
             <a:extLst>
               <a:ext uri="{FF2B5EF4-FFF2-40B4-BE49-F238E27FC236}">
-                <a16:creationId xmlns:a16="http://schemas.microsoft.com/office/drawing/2014/main" id="{6958BB78-804F-3D02-73C6-8B92946505A8}"/>
+                <a16:creationId xmlns:a16="http://schemas.microsoft.com/office/drawing/2014/main" id="{78575FAF-3051-4771-D428-279A106357FB}"/>
               </a:ext>
             </a:extLst>
           </p:cNvPr>
-          <p:cNvSpPr>
-            <a:spLocks noGrp="1"/>
-          </p:cNvSpPr>
+          <p:cNvPicPr>
+            <a:picLocks noGrp="1" noChangeAspect="1"/>
+          </p:cNvPicPr>
           <p:nvPr>
             <p:ph idx="1"/>
           </p:nvPr>
-        </p:nvSpPr>
-        <p:spPr/>
-        <p:txBody>
-          <a:bodyPr/>
-          <a:lstStyle/>
-          <a:p>
-            <a:r>
-              <a:rPr lang="en-US" dirty="0"/>
-              <a:t>+/- correlation between disease prevalence and # of grocers per zip</a:t>
-            </a:r>
-          </a:p>
-          <a:p>
-            <a:r>
-              <a:rPr lang="en-US" dirty="0"/>
-              <a:t>Scatter plot and trend line with correlation number on this slide, or next slide</a:t>
-            </a:r>
-          </a:p>
-        </p:txBody>
-      </p:sp>
+        </p:nvPicPr>
+        <p:blipFill>
+          <a:blip r:embed="rId3"/>
+          <a:stretch>
+            <a:fillRect/>
+          </a:stretch>
+        </p:blipFill>
+        <p:spPr>
+          <a:xfrm>
+            <a:off x="677334" y="0"/>
+            <a:ext cx="9678894" cy="6248400"/>
+          </a:xfrm>
+        </p:spPr>
+      </p:pic>
     </p:spTree>
     <p:extLst>
       <p:ext uri="{BB962C8B-B14F-4D97-AF65-F5344CB8AC3E}">
-        <p14:creationId xmlns:p14="http://schemas.microsoft.com/office/powerpoint/2010/main" val="2032460076"/>
+        <p14:creationId xmlns:p14="http://schemas.microsoft.com/office/powerpoint/2010/main" val="3012565670"/>
       </p:ext>
     </p:extLst>
   </p:cSld>
@@ -7329,7 +7873,7 @@
           <p:cNvPr id="2" name="Title 1">
             <a:extLst>
               <a:ext uri="{FF2B5EF4-FFF2-40B4-BE49-F238E27FC236}">
-                <a16:creationId xmlns:a16="http://schemas.microsoft.com/office/drawing/2014/main" id="{52B60D75-208D-5399-8893-8A26B6F229B4}"/>
+                <a16:creationId xmlns:a16="http://schemas.microsoft.com/office/drawing/2014/main" id="{9A6A4D31-3F31-2363-64CA-25D86BF1533C}"/>
               </a:ext>
             </a:extLst>
           </p:cNvPr>
@@ -7342,46 +7886,24 @@
         </p:nvSpPr>
         <p:spPr/>
         <p:txBody>
-          <a:bodyPr/>
+          <a:bodyPr>
+            <a:normAutofit fontScale="90000"/>
+          </a:bodyPr>
           <a:lstStyle/>
           <a:p>
             <a:r>
               <a:rPr lang="en-US" dirty="0"/>
-              <a:t>obesity scatterplot</a:t>
-            </a:r>
-          </a:p>
-        </p:txBody>
-      </p:sp>
-      <p:sp>
-        <p:nvSpPr>
-          <p:cNvPr id="3" name="Content Placeholder 2">
-            <a:extLst>
-              <a:ext uri="{FF2B5EF4-FFF2-40B4-BE49-F238E27FC236}">
-                <a16:creationId xmlns:a16="http://schemas.microsoft.com/office/drawing/2014/main" id="{6958BB78-804F-3D02-73C6-8B92946505A8}"/>
-              </a:ext>
-            </a:extLst>
-          </p:cNvPr>
-          <p:cNvSpPr>
-            <a:spLocks noGrp="1"/>
-          </p:cNvSpPr>
-          <p:nvPr>
-            <p:ph idx="1"/>
-          </p:nvPr>
-        </p:nvSpPr>
-        <p:spPr/>
-        <p:txBody>
-          <a:bodyPr/>
-          <a:lstStyle/>
-          <a:p>
-            <a:r>
+              <a:t>Why does one zip code have a total of 9 grocery stores while other zip codes only have one?</a:t>
+            </a:r>
+            <a:br>
               <a:rPr lang="en-US" dirty="0"/>
-              <a:t>+/- correlation between disease prevalence and # of grocers per zip</a:t>
-            </a:r>
-          </a:p>
-          <a:p>
-            <a:r>
+            </a:br>
+            <a:br>
               <a:rPr lang="en-US" dirty="0"/>
-              <a:t>Scatter plot and trend line with correlation number on this slide, or next slide</a:t>
+            </a:br>
+            <a:r>
+              <a:rPr lang="en-US" dirty="0"/>
+              <a:t>What percentage of grocery stores that one zip code accounts for</a:t>
             </a:r>
           </a:p>
         </p:txBody>
@@ -7389,7 +7911,7 @@
     </p:spTree>
     <p:extLst>
       <p:ext uri="{BB962C8B-B14F-4D97-AF65-F5344CB8AC3E}">
-        <p14:creationId xmlns:p14="http://schemas.microsoft.com/office/powerpoint/2010/main" val="1434644402"/>
+        <p14:creationId xmlns:p14="http://schemas.microsoft.com/office/powerpoint/2010/main" val="2713106244"/>
       </p:ext>
     </p:extLst>
   </p:cSld>
@@ -7421,7 +7943,7 @@
           <p:cNvPr id="2" name="Title 1">
             <a:extLst>
               <a:ext uri="{FF2B5EF4-FFF2-40B4-BE49-F238E27FC236}">
-                <a16:creationId xmlns:a16="http://schemas.microsoft.com/office/drawing/2014/main" id="{52B60D75-208D-5399-8893-8A26B6F229B4}"/>
+                <a16:creationId xmlns:a16="http://schemas.microsoft.com/office/drawing/2014/main" id="{EE939CEF-D313-650F-CDED-D901767987C6}"/>
               </a:ext>
             </a:extLst>
           </p:cNvPr>
@@ -7439,8 +7961,12 @@
           <a:p>
             <a:r>
               <a:rPr lang="en-US" dirty="0"/>
-              <a:t>stroke scatterplot</a:t>
-            </a:r>
+              <a:t>Works Cited </a:t>
+            </a:r>
+            <a:br>
+              <a:rPr lang="en-US" dirty="0"/>
+            </a:br>
+            <a:endParaRPr lang="en-US" dirty="0"/>
           </a:p>
         </p:txBody>
       </p:sp>
@@ -7449,7 +7975,7 @@
           <p:cNvPr id="3" name="Content Placeholder 2">
             <a:extLst>
               <a:ext uri="{FF2B5EF4-FFF2-40B4-BE49-F238E27FC236}">
-                <a16:creationId xmlns:a16="http://schemas.microsoft.com/office/drawing/2014/main" id="{6958BB78-804F-3D02-73C6-8B92946505A8}"/>
+                <a16:creationId xmlns:a16="http://schemas.microsoft.com/office/drawing/2014/main" id="{2EECEF7C-B273-D9AF-B1C7-784CE704E0C5}"/>
               </a:ext>
             </a:extLst>
           </p:cNvPr>
@@ -7460,28 +7986,161 @@
             <p:ph idx="1"/>
           </p:nvPr>
         </p:nvSpPr>
-        <p:spPr/>
-        <p:txBody>
-          <a:bodyPr/>
-          <a:lstStyle/>
+        <p:spPr>
+          <a:xfrm>
+            <a:off x="677334" y="1488613"/>
+            <a:ext cx="8596668" cy="3880773"/>
+          </a:xfrm>
+        </p:spPr>
+        <p:txBody>
+          <a:bodyPr>
+            <a:normAutofit fontScale="62500" lnSpcReduction="20000"/>
+          </a:bodyPr>
+          <a:lstStyle/>
+          <a:p>
+            <a:pPr marL="0" indent="0">
+              <a:buNone/>
+            </a:pPr>
+            <a:endParaRPr lang="en-US" dirty="0"/>
+          </a:p>
           <a:p>
             <a:r>
               <a:rPr lang="en-US" dirty="0"/>
-              <a:t>+/- correlation between disease prevalence and # of grocers per zip</a:t>
-            </a:r>
+              <a:t>Gallagher, M. (2006). Examining the Impact of Food Deserts on Public Health in Chicago. Study commissioned by LaSalle Bank. 2006. Retrieved 4/25/22 from </a:t>
+            </a:r>
+            <a:r>
+              <a:rPr lang="en-US" dirty="0">
+                <a:hlinkClick r:id="rId3"/>
+              </a:rPr>
+              <a:t>http://www.marigallagher.com/2006/07/18/examining-the-impact-of-food-deserts-on-public-health-in-chicago-july-18-2006/</a:t>
+            </a:r>
+            <a:endParaRPr lang="en-US" dirty="0"/>
+          </a:p>
+          <a:p>
+            <a:endParaRPr lang="en-US" dirty="0"/>
           </a:p>
           <a:p>
             <a:r>
               <a:rPr lang="en-US" dirty="0"/>
-              <a:t>Scatter plot and trend line with correlation number on this slide, or next slide</a:t>
-            </a:r>
+              <a:t>Morland, K., Wing, S., et al. (2002). Neighborhood characteristics associated with the location of food stores and food service places. </a:t>
+            </a:r>
+            <a:r>
+              <a:rPr lang="en-US" i="1" dirty="0"/>
+              <a:t>American Journal of Preventive Medicine</a:t>
+            </a:r>
+            <a:r>
+              <a:rPr lang="en-US" dirty="0"/>
+              <a:t>. 22(1),23-29. Retrieved 4/25/22 from  </a:t>
+            </a:r>
+            <a:r>
+              <a:rPr lang="en-US" dirty="0">
+                <a:hlinkClick r:id="rId4"/>
+              </a:rPr>
+              <a:t>http://www.ncbi.nlm.nih.gov/pubmed/11777675</a:t>
+            </a:r>
+            <a:r>
+              <a:rPr lang="en-US" dirty="0"/>
+              <a:t> </a:t>
+            </a:r>
+          </a:p>
+          <a:p>
+            <a:endParaRPr lang="en-US" dirty="0"/>
+          </a:p>
+          <a:p>
+            <a:r>
+              <a:rPr lang="en-US" dirty="0"/>
+              <a:t>United States Department of Agriculture Economic Research Service. (2009). </a:t>
+            </a:r>
+            <a:r>
+              <a:rPr lang="en-US" i="1" dirty="0"/>
+              <a:t>Access to Affordable and Nutritious Food: Measuring and Understanding Food Deserts and Their Consequences.</a:t>
+            </a:r>
+            <a:r>
+              <a:rPr lang="en-US" dirty="0"/>
+              <a:t> Retrieved 4/25/22 from </a:t>
+            </a:r>
+            <a:r>
+              <a:rPr lang="en-US" dirty="0">
+                <a:hlinkClick r:id="rId5"/>
+              </a:rPr>
+              <a:t>https://www.ers.usda.gov/webdocs/publications/42711/12716_ap036_1_.pdf?v=41055</a:t>
+            </a:r>
+            <a:endParaRPr lang="en-US" dirty="0"/>
+          </a:p>
+          <a:p>
+            <a:endParaRPr lang="en-US" b="1" dirty="0"/>
+          </a:p>
+          <a:p>
+            <a:r>
+              <a:rPr lang="en-US" dirty="0"/>
+              <a:t>University of Nevada, Reno. (n.d.).</a:t>
+            </a:r>
+            <a:r>
+              <a:rPr lang="en-US" i="1" dirty="0"/>
+              <a:t>What is a Food Desert?</a:t>
+            </a:r>
+            <a:r>
+              <a:rPr lang="en-US" dirty="0"/>
+              <a:t>. </a:t>
+            </a:r>
+            <a:r>
+              <a:rPr lang="en-US" dirty="0">
+                <a:hlinkClick r:id="rId6"/>
+              </a:rPr>
+              <a:t>https://extension.unr.edu/publication.aspx?PubID=2484</a:t>
+            </a:r>
+            <a:endParaRPr lang="en-US" dirty="0"/>
+          </a:p>
+          <a:p>
+            <a:endParaRPr lang="en-US" dirty="0"/>
+          </a:p>
+          <a:p>
+            <a:r>
+              <a:rPr lang="en-US" dirty="0"/>
+              <a:t>Ver Ploeg, M., </a:t>
+            </a:r>
+            <a:r>
+              <a:rPr lang="en-US" dirty="0" err="1"/>
+              <a:t>Nulph</a:t>
+            </a:r>
+            <a:r>
+              <a:rPr lang="en-US" dirty="0"/>
+              <a:t>, D., &amp; Williams, R. (2011). </a:t>
+            </a:r>
+            <a:r>
+              <a:rPr lang="en-US" i="1" dirty="0"/>
+              <a:t>Mapping Food Deserts in the United States.</a:t>
+            </a:r>
+            <a:r>
+              <a:rPr lang="en-US" dirty="0"/>
+              <a:t> Economic Research Service U.S. Department of Agriculture. Retrieved 4/25/22 from </a:t>
+            </a:r>
+            <a:r>
+              <a:rPr lang="en-US" dirty="0">
+                <a:hlinkClick r:id="rId7"/>
+              </a:rPr>
+              <a:t>https://www.ers.usda.gov/amber-waves/2011/december/data-feature-mapping-food-deserts-in-the-us/</a:t>
+            </a:r>
+            <a:endParaRPr lang="en-US" dirty="0"/>
+          </a:p>
+          <a:p>
+            <a:endParaRPr lang="en-US" dirty="0"/>
+          </a:p>
+          <a:p>
+            <a:endParaRPr lang="en-US" dirty="0"/>
+          </a:p>
+          <a:p>
+            <a:endParaRPr lang="en-US" dirty="0"/>
+          </a:p>
+          <a:p>
+            <a:endParaRPr lang="en-US" dirty="0"/>
           </a:p>
         </p:txBody>
       </p:sp>
     </p:spTree>
     <p:extLst>
       <p:ext uri="{BB962C8B-B14F-4D97-AF65-F5344CB8AC3E}">
-        <p14:creationId xmlns:p14="http://schemas.microsoft.com/office/powerpoint/2010/main" val="316085506"/>
+        <p14:creationId xmlns:p14="http://schemas.microsoft.com/office/powerpoint/2010/main" val="2084559206"/>
       </p:ext>
     </p:extLst>
   </p:cSld>
@@ -7513,7 +8172,7 @@
           <p:cNvPr id="2" name="Title 1">
             <a:extLst>
               <a:ext uri="{FF2B5EF4-FFF2-40B4-BE49-F238E27FC236}">
-                <a16:creationId xmlns:a16="http://schemas.microsoft.com/office/drawing/2014/main" id="{EE939CEF-D313-650F-CDED-D901767987C6}"/>
+                <a16:creationId xmlns:a16="http://schemas.microsoft.com/office/drawing/2014/main" id="{F93A99E5-7A26-54F0-7699-063A5CE75FA6}"/>
               </a:ext>
             </a:extLst>
           </p:cNvPr>
@@ -7524,208 +8183,28 @@
             <p:ph type="title"/>
           </p:nvPr>
         </p:nvSpPr>
-        <p:spPr/>
-        <p:txBody>
-          <a:bodyPr/>
-          <a:lstStyle/>
-          <a:p>
-            <a:r>
-              <a:rPr lang="en-US" dirty="0"/>
-              <a:t>Works Cited </a:t>
-            </a:r>
-            <a:br>
-              <a:rPr lang="en-US" dirty="0"/>
-            </a:br>
-            <a:endParaRPr lang="en-US" dirty="0"/>
-          </a:p>
-        </p:txBody>
-      </p:sp>
-      <p:sp>
-        <p:nvSpPr>
-          <p:cNvPr id="3" name="Content Placeholder 2">
-            <a:extLst>
-              <a:ext uri="{FF2B5EF4-FFF2-40B4-BE49-F238E27FC236}">
-                <a16:creationId xmlns:a16="http://schemas.microsoft.com/office/drawing/2014/main" id="{2EECEF7C-B273-D9AF-B1C7-784CE704E0C5}"/>
-              </a:ext>
-            </a:extLst>
-          </p:cNvPr>
-          <p:cNvSpPr>
-            <a:spLocks noGrp="1"/>
-          </p:cNvSpPr>
-          <p:nvPr>
-            <p:ph idx="1"/>
-          </p:nvPr>
-        </p:nvSpPr>
         <p:spPr>
           <a:xfrm>
-            <a:off x="677334" y="1488613"/>
-            <a:ext cx="8596668" cy="3880773"/>
+            <a:off x="1797666" y="2768600"/>
+            <a:ext cx="8596668" cy="1320800"/>
           </a:xfrm>
         </p:spPr>
         <p:txBody>
-          <a:bodyPr>
-            <a:normAutofit fontScale="62500" lnSpcReduction="20000"/>
-          </a:bodyPr>
-          <a:lstStyle/>
-          <a:p>
-            <a:pPr marL="0" indent="0">
-              <a:buNone/>
-            </a:pPr>
-            <a:endParaRPr lang="en-US" dirty="0"/>
-          </a:p>
-          <a:p>
+          <a:bodyPr/>
+          <a:lstStyle/>
+          <a:p>
+            <a:pPr algn="ctr"/>
             <a:r>
               <a:rPr lang="en-US" dirty="0"/>
-              <a:t>United States Department of Agriculture Economic Research Service. (2009). </a:t>
-            </a:r>
-            <a:r>
-              <a:rPr lang="en-US" i="1" dirty="0"/>
-              <a:t>Access to Affordable and Nutritious Food: Measuring and Understanding Food Deserts and Their Consequences.</a:t>
-            </a:r>
-            <a:r>
-              <a:rPr lang="en-US" dirty="0"/>
-              <a:t> Retrieved 4/25/22 from </a:t>
-            </a:r>
-            <a:r>
-              <a:rPr lang="en-US" dirty="0">
-                <a:hlinkClick r:id="rId3"/>
-              </a:rPr>
-              <a:t>https://www.ers.usda.gov/webdocs/publications/42711/12716_ap036_1_.pdf?v=41055</a:t>
-            </a:r>
-            <a:endParaRPr lang="en-US" dirty="0"/>
-          </a:p>
-          <a:p>
-            <a:endParaRPr lang="en-US" dirty="0"/>
-          </a:p>
-          <a:p>
-            <a:r>
-              <a:rPr lang="en-US" dirty="0"/>
-              <a:t>Gallagher, M. (2006). Examining the Impact of Food Deserts on Public Health in Chicago. Study commissioned by LaSalle Bank. 2006. Retrieved 4/25/22 from </a:t>
-            </a:r>
-            <a:r>
-              <a:rPr lang="en-US" dirty="0">
-                <a:hlinkClick r:id="rId4"/>
-              </a:rPr>
-              <a:t>http://www.marigallagher.com/2006/07/18/examining-the-impact-of-food-deserts-on-public-health-in-chicago-july-18-2006/</a:t>
-            </a:r>
-            <a:endParaRPr lang="en-US" dirty="0"/>
-          </a:p>
-          <a:p>
-            <a:endParaRPr lang="en-US" dirty="0"/>
-          </a:p>
-          <a:p>
-            <a:r>
-              <a:rPr lang="en-US" dirty="0"/>
-              <a:t>Morland, K., Wing, S., et al. (2002). Neighborhood characteristics associated with the location of food stores and food service places. </a:t>
-            </a:r>
-            <a:r>
-              <a:rPr lang="en-US" i="1" dirty="0"/>
-              <a:t>American Journal of Preventive Medicine</a:t>
-            </a:r>
-            <a:r>
-              <a:rPr lang="en-US" dirty="0"/>
-              <a:t>. 22(1),23-29. Retrieved 4/25/22 from  </a:t>
-            </a:r>
-            <a:r>
-              <a:rPr lang="en-US" dirty="0">
-                <a:hlinkClick r:id="rId5"/>
-              </a:rPr>
-              <a:t>http://www.ncbi.nlm.nih.gov/pubmed/11777675</a:t>
-            </a:r>
-            <a:r>
-              <a:rPr lang="en-US" dirty="0"/>
-              <a:t> </a:t>
-            </a:r>
-          </a:p>
-          <a:p>
-            <a:endParaRPr lang="en-US" dirty="0"/>
-          </a:p>
-          <a:p>
-            <a:r>
-              <a:rPr lang="en-US" dirty="0"/>
-              <a:t>Ver Ploeg, M., </a:t>
-            </a:r>
-            <a:r>
-              <a:rPr lang="en-US" dirty="0" err="1"/>
-              <a:t>Nulph</a:t>
-            </a:r>
-            <a:r>
-              <a:rPr lang="en-US" dirty="0"/>
-              <a:t>, D., &amp; Williams, R. (2011). </a:t>
-            </a:r>
-            <a:r>
-              <a:rPr lang="en-US" i="1" dirty="0"/>
-              <a:t>Mapping Food Deserts in the United States.</a:t>
-            </a:r>
-            <a:r>
-              <a:rPr lang="en-US" dirty="0"/>
-              <a:t> Economic Research Service U.S. Department of Agriculture. Retrieved 4/25/22 from </a:t>
-            </a:r>
-            <a:r>
-              <a:rPr lang="en-US" dirty="0">
-                <a:hlinkClick r:id="rId6"/>
-              </a:rPr>
-              <a:t>https://www.ers.usda.gov/amber-waves/2011/december/data-feature-mapping-food-deserts-in-the-us/</a:t>
-            </a:r>
-            <a:endParaRPr lang="en-US" dirty="0"/>
-          </a:p>
-          <a:p>
-            <a:endParaRPr lang="en-US" b="1" dirty="0"/>
-          </a:p>
-          <a:p>
-            <a:r>
-              <a:rPr lang="en-US" dirty="0"/>
-              <a:t>University of Nevada, Reno. (n.d.).</a:t>
-            </a:r>
-            <a:r>
-              <a:rPr lang="en-US" i="1" dirty="0"/>
-              <a:t>What is a Food Desert?</a:t>
-            </a:r>
-            <a:r>
-              <a:rPr lang="en-US" dirty="0"/>
-              <a:t>. </a:t>
-            </a:r>
-            <a:r>
-              <a:rPr lang="en-US" dirty="0">
-                <a:hlinkClick r:id="rId7"/>
-              </a:rPr>
-              <a:t>https://</a:t>
-            </a:r>
-            <a:r>
-              <a:rPr lang="en-US" dirty="0" err="1">
-                <a:hlinkClick r:id="rId7"/>
-              </a:rPr>
-              <a:t>extension.unr.edu</a:t>
-            </a:r>
-            <a:r>
-              <a:rPr lang="en-US" dirty="0">
-                <a:hlinkClick r:id="rId7"/>
-              </a:rPr>
-              <a:t>/</a:t>
-            </a:r>
-            <a:r>
-              <a:rPr lang="en-US" dirty="0" err="1">
-                <a:hlinkClick r:id="rId7"/>
-              </a:rPr>
-              <a:t>publication.aspx?PubID</a:t>
-            </a:r>
-            <a:r>
-              <a:rPr lang="en-US" dirty="0">
-                <a:hlinkClick r:id="rId7"/>
-              </a:rPr>
-              <a:t>=2484</a:t>
-            </a:r>
-            <a:endParaRPr lang="en-US" dirty="0"/>
-          </a:p>
-          <a:p>
-            <a:endParaRPr lang="en-US" dirty="0"/>
+              <a:t>Questions?</a:t>
+            </a:r>
           </a:p>
         </p:txBody>
       </p:sp>
     </p:spTree>
     <p:extLst>
       <p:ext uri="{BB962C8B-B14F-4D97-AF65-F5344CB8AC3E}">
-        <p14:creationId xmlns:p14="http://schemas.microsoft.com/office/powerpoint/2010/main" val="2084559206"/>
+        <p14:creationId xmlns:p14="http://schemas.microsoft.com/office/powerpoint/2010/main" val="4170679358"/>
       </p:ext>
     </p:extLst>
   </p:cSld>
@@ -7757,70 +8236,6 @@
           <p:cNvPr id="2" name="Title 1">
             <a:extLst>
               <a:ext uri="{FF2B5EF4-FFF2-40B4-BE49-F238E27FC236}">
-                <a16:creationId xmlns:a16="http://schemas.microsoft.com/office/drawing/2014/main" id="{F93A99E5-7A26-54F0-7699-063A5CE75FA6}"/>
-              </a:ext>
-            </a:extLst>
-          </p:cNvPr>
-          <p:cNvSpPr>
-            <a:spLocks noGrp="1"/>
-          </p:cNvSpPr>
-          <p:nvPr>
-            <p:ph type="title"/>
-          </p:nvPr>
-        </p:nvSpPr>
-        <p:spPr>
-          <a:xfrm>
-            <a:off x="658091" y="2108200"/>
-            <a:ext cx="8596668" cy="1320800"/>
-          </a:xfrm>
-        </p:spPr>
-        <p:txBody>
-          <a:bodyPr/>
-          <a:lstStyle/>
-          <a:p>
-            <a:pPr algn="ctr"/>
-            <a:r>
-              <a:rPr lang="en-US" dirty="0"/>
-              <a:t>Questions?</a:t>
-            </a:r>
-          </a:p>
-        </p:txBody>
-      </p:sp>
-    </p:spTree>
-    <p:extLst>
-      <p:ext uri="{BB962C8B-B14F-4D97-AF65-F5344CB8AC3E}">
-        <p14:creationId xmlns:p14="http://schemas.microsoft.com/office/powerpoint/2010/main" val="4170679358"/>
-      </p:ext>
-    </p:extLst>
-  </p:cSld>
-  <p:clrMapOvr>
-    <a:masterClrMapping/>
-  </p:clrMapOvr>
-</p:sld>
-</file>
-
-<file path=ppt/slides/slide18.xml><?xml version="1.0" encoding="utf-8"?>
-<p:sld xmlns:a="http://schemas.openxmlformats.org/drawingml/2006/main" xmlns:r="http://schemas.openxmlformats.org/officeDocument/2006/relationships" xmlns:p="http://schemas.openxmlformats.org/presentationml/2006/main">
-  <p:cSld>
-    <p:spTree>
-      <p:nvGrpSpPr>
-        <p:cNvPr id="1" name=""/>
-        <p:cNvGrpSpPr/>
-        <p:nvPr/>
-      </p:nvGrpSpPr>
-      <p:grpSpPr>
-        <a:xfrm>
-          <a:off x="0" y="0"/>
-          <a:ext cx="0" cy="0"/>
-          <a:chOff x="0" y="0"/>
-          <a:chExt cx="0" cy="0"/>
-        </a:xfrm>
-      </p:grpSpPr>
-      <p:sp>
-        <p:nvSpPr>
-          <p:cNvPr id="2" name="Title 1">
-            <a:extLst>
-              <a:ext uri="{FF2B5EF4-FFF2-40B4-BE49-F238E27FC236}">
                 <a16:creationId xmlns:a16="http://schemas.microsoft.com/office/drawing/2014/main" id="{1F814D6E-00AA-775A-FF50-94D7BE631017}"/>
               </a:ext>
             </a:extLst>
@@ -7832,15 +8247,24 @@
             <p:ph type="title"/>
           </p:nvPr>
         </p:nvSpPr>
-        <p:spPr/>
+        <p:spPr>
+          <a:xfrm>
+            <a:off x="1797666" y="2768600"/>
+            <a:ext cx="8596668" cy="1320800"/>
+          </a:xfrm>
+        </p:spPr>
         <p:txBody>
           <a:bodyPr/>
           <a:lstStyle/>
           <a:p>
-            <a:r>
-              <a:rPr lang="en-US" dirty="0"/>
-              <a:t>“Off to the dashboard” [hyperlink to Tableau Public dashboard]</a:t>
-            </a:r>
+            <a:pPr algn="ctr"/>
+            <a:r>
+              <a:rPr lang="en-US" dirty="0">
+                <a:hlinkClick r:id="rId2"/>
+              </a:rPr>
+              <a:t>Off to the dashboard!</a:t>
+            </a:r>
+            <a:endParaRPr lang="en-US" dirty="0"/>
           </a:p>
         </p:txBody>
       </p:sp>
@@ -8103,7 +8527,7 @@
           <p:cNvPr id="2" name="Title 1">
             <a:extLst>
               <a:ext uri="{FF2B5EF4-FFF2-40B4-BE49-F238E27FC236}">
-                <a16:creationId xmlns:a16="http://schemas.microsoft.com/office/drawing/2014/main" id="{DFB062F9-C2A6-2AA3-506F-6CB236FC137C}"/>
+                <a16:creationId xmlns:a16="http://schemas.microsoft.com/office/drawing/2014/main" id="{014E76D0-5289-B01E-CC61-A570F8628798}"/>
               </a:ext>
             </a:extLst>
           </p:cNvPr>
@@ -8121,7 +8545,7 @@
           <a:p>
             <a:r>
               <a:rPr lang="en-US" dirty="0"/>
-              <a:t>Non-health related impacts of food deserts</a:t>
+              <a:t>Health Impacts on Individuals/Communities</a:t>
             </a:r>
           </a:p>
         </p:txBody>
@@ -8131,7 +8555,7 @@
           <p:cNvPr id="3" name="Content Placeholder 2">
             <a:extLst>
               <a:ext uri="{FF2B5EF4-FFF2-40B4-BE49-F238E27FC236}">
-                <a16:creationId xmlns:a16="http://schemas.microsoft.com/office/drawing/2014/main" id="{E1A493ED-0A83-43A6-4936-6BBB36FFE4C7}"/>
+                <a16:creationId xmlns:a16="http://schemas.microsoft.com/office/drawing/2014/main" id="{57365260-FD45-C2D7-27A0-4372061593F9}"/>
               </a:ext>
             </a:extLst>
           </p:cNvPr>
@@ -8144,12 +8568,76 @@
         </p:nvSpPr>
         <p:spPr/>
         <p:txBody>
-          <a:bodyPr/>
+          <a:bodyPr>
+            <a:normAutofit/>
+          </a:bodyPr>
           <a:lstStyle/>
           <a:p>
             <a:r>
               <a:rPr lang="en-US" dirty="0"/>
-              <a:t>Socioeconomic discrimination</a:t>
+              <a:t>Wealthier neighborhoods: over three times as many supermarkets, compared to lower income neighborhoods</a:t>
+            </a:r>
+          </a:p>
+          <a:p>
+            <a:r>
+              <a:rPr lang="en-US" dirty="0"/>
+              <a:t>Availability of personal transportation can contribute to malnutrition</a:t>
+            </a:r>
+          </a:p>
+          <a:p>
+            <a:r>
+              <a:rPr lang="en-US" dirty="0"/>
+              <a:t>Minority communities have fewer food choices and more premature death</a:t>
+            </a:r>
+          </a:p>
+          <a:p>
+            <a:pPr marL="0" indent="0">
+              <a:buNone/>
+            </a:pPr>
+            <a:endParaRPr lang="en-US" dirty="0"/>
+          </a:p>
+          <a:p>
+            <a:endParaRPr lang="en-US" dirty="0"/>
+          </a:p>
+        </p:txBody>
+      </p:sp>
+      <p:sp>
+        <p:nvSpPr>
+          <p:cNvPr id="4" name="TextBox 3">
+            <a:extLst>
+              <a:ext uri="{FF2B5EF4-FFF2-40B4-BE49-F238E27FC236}">
+                <a16:creationId xmlns:a16="http://schemas.microsoft.com/office/drawing/2014/main" id="{FEC01250-E187-F686-CE64-E8FA6AFE7F5E}"/>
+              </a:ext>
+            </a:extLst>
+          </p:cNvPr>
+          <p:cNvSpPr txBox="1"/>
+          <p:nvPr/>
+        </p:nvSpPr>
+        <p:spPr>
+          <a:xfrm>
+            <a:off x="773109" y="5610475"/>
+            <a:ext cx="4041422" cy="800219"/>
+          </a:xfrm>
+          <a:prstGeom prst="rect">
+            <a:avLst/>
+          </a:prstGeom>
+          <a:noFill/>
+        </p:spPr>
+        <p:txBody>
+          <a:bodyPr wrap="square" rtlCol="0">
+            <a:spAutoFit/>
+          </a:bodyPr>
+          <a:lstStyle/>
+          <a:p>
+            <a:r>
+              <a:rPr lang="en-US" sz="1400" dirty="0"/>
+              <a:t>Morland, Wing, 2002</a:t>
+            </a:r>
+          </a:p>
+          <a:p>
+            <a:r>
+              <a:rPr lang="en-US" sz="1400" dirty="0"/>
+              <a:t>Gallagher, 2006</a:t>
             </a:r>
           </a:p>
           <a:p>
@@ -8160,7 +8648,7 @@
     </p:spTree>
     <p:extLst>
       <p:ext uri="{BB962C8B-B14F-4D97-AF65-F5344CB8AC3E}">
-        <p14:creationId xmlns:p14="http://schemas.microsoft.com/office/powerpoint/2010/main" val="1179435448"/>
+        <p14:creationId xmlns:p14="http://schemas.microsoft.com/office/powerpoint/2010/main" val="3696257086"/>
       </p:ext>
     </p:extLst>
   </p:cSld>
@@ -8192,7 +8680,7 @@
           <p:cNvPr id="2" name="Title 1">
             <a:extLst>
               <a:ext uri="{FF2B5EF4-FFF2-40B4-BE49-F238E27FC236}">
-                <a16:creationId xmlns:a16="http://schemas.microsoft.com/office/drawing/2014/main" id="{014E76D0-5289-B01E-CC61-A570F8628798}"/>
+                <a16:creationId xmlns:a16="http://schemas.microsoft.com/office/drawing/2014/main" id="{81CCD0A3-40EF-F958-5466-7C5AD6E9616F}"/>
               </a:ext>
             </a:extLst>
           </p:cNvPr>
@@ -8210,7 +8698,7 @@
           <a:p>
             <a:r>
               <a:rPr lang="en-US" dirty="0"/>
-              <a:t>Health Impacts on Individuals/Communities</a:t>
+              <a:t>Reasoning Behind my Analysis</a:t>
             </a:r>
           </a:p>
         </p:txBody>
@@ -8220,7 +8708,7 @@
           <p:cNvPr id="3" name="Content Placeholder 2">
             <a:extLst>
               <a:ext uri="{FF2B5EF4-FFF2-40B4-BE49-F238E27FC236}">
-                <a16:creationId xmlns:a16="http://schemas.microsoft.com/office/drawing/2014/main" id="{57365260-FD45-C2D7-27A0-4372061593F9}"/>
+                <a16:creationId xmlns:a16="http://schemas.microsoft.com/office/drawing/2014/main" id="{B313E338-FCC9-3C03-D40D-A703E41CEB75}"/>
               </a:ext>
             </a:extLst>
           </p:cNvPr>
@@ -8231,78 +8719,43 @@
             <p:ph idx="1"/>
           </p:nvPr>
         </p:nvSpPr>
-        <p:spPr/>
-        <p:txBody>
-          <a:bodyPr>
-            <a:normAutofit/>
-          </a:bodyPr>
-          <a:lstStyle/>
-          <a:p>
-            <a:r>
-              <a:rPr lang="en-US" dirty="0"/>
-              <a:t>Wealthier neighborhoods: over three times as many supermarkets, compared to lower income neighborhoods</a:t>
-            </a:r>
-          </a:p>
-          <a:p>
-            <a:r>
-              <a:rPr lang="en-US" dirty="0"/>
-              <a:t>Lack of transportation contributes to malnutrition</a:t>
-            </a:r>
-          </a:p>
-          <a:p>
-            <a:r>
-              <a:rPr lang="en-US" dirty="0"/>
-              <a:t>Minority communities have fewer food choices and more premature death</a:t>
-            </a:r>
-          </a:p>
-          <a:p>
-            <a:pPr marL="0" indent="0">
-              <a:buNone/>
-            </a:pPr>
-            <a:endParaRPr lang="en-US" dirty="0"/>
-          </a:p>
-          <a:p>
-            <a:endParaRPr lang="en-US" dirty="0"/>
-          </a:p>
-        </p:txBody>
-      </p:sp>
-      <p:sp>
-        <p:nvSpPr>
-          <p:cNvPr id="4" name="TextBox 3">
-            <a:extLst>
-              <a:ext uri="{FF2B5EF4-FFF2-40B4-BE49-F238E27FC236}">
-                <a16:creationId xmlns:a16="http://schemas.microsoft.com/office/drawing/2014/main" id="{FEC01250-E187-F686-CE64-E8FA6AFE7F5E}"/>
-              </a:ext>
-            </a:extLst>
-          </p:cNvPr>
-          <p:cNvSpPr txBox="1"/>
-          <p:nvPr/>
-        </p:nvSpPr>
         <p:spPr>
           <a:xfrm>
-            <a:off x="773109" y="5610475"/>
-            <a:ext cx="4041422" cy="800219"/>
+            <a:off x="677334" y="1488613"/>
+            <a:ext cx="8596668" cy="3880773"/>
           </a:xfrm>
-          <a:prstGeom prst="rect">
-            <a:avLst/>
-          </a:prstGeom>
-          <a:noFill/>
         </p:spPr>
         <p:txBody>
-          <a:bodyPr wrap="square" rtlCol="0">
-            <a:spAutoFit/>
-          </a:bodyPr>
-          <a:lstStyle/>
-          <a:p>
-            <a:r>
-              <a:rPr lang="en-US" sz="1400" dirty="0"/>
-              <a:t>Morland, Wing, 2002</a:t>
-            </a:r>
-          </a:p>
-          <a:p>
-            <a:r>
-              <a:rPr lang="en-US" sz="1400" dirty="0"/>
-              <a:t>Gallagher, 2006</a:t>
+          <a:bodyPr/>
+          <a:lstStyle/>
+          <a:p>
+            <a:r>
+              <a:rPr lang="en-US" dirty="0"/>
+              <a:t>Initial lightbulb moment: the Piggly Wiggly on West End closed down</a:t>
+            </a:r>
+          </a:p>
+          <a:p>
+            <a:r>
+              <a:rPr lang="en-US" dirty="0"/>
+              <a:t>Rising food costs</a:t>
+            </a:r>
+          </a:p>
+          <a:p>
+            <a:r>
+              <a:rPr lang="en-US" dirty="0"/>
+              <a:t>Nashville has less than ideal public transportation (subjective opinion)</a:t>
+            </a:r>
+          </a:p>
+          <a:p>
+            <a:r>
+              <a:rPr lang="en-US" dirty="0"/>
+              <a:t>I am an RN, but public health is everyone’s business</a:t>
+            </a:r>
+          </a:p>
+          <a:p>
+            <a:r>
+              <a:rPr lang="en-US" dirty="0"/>
+              <a:t>Everyone loves food</a:t>
             </a:r>
           </a:p>
           <a:p>
@@ -8313,7 +8766,7 @@
     </p:spTree>
     <p:extLst>
       <p:ext uri="{BB962C8B-B14F-4D97-AF65-F5344CB8AC3E}">
-        <p14:creationId xmlns:p14="http://schemas.microsoft.com/office/powerpoint/2010/main" val="3696257086"/>
+        <p14:creationId xmlns:p14="http://schemas.microsoft.com/office/powerpoint/2010/main" val="4268277911"/>
       </p:ext>
     </p:extLst>
   </p:cSld>
@@ -8345,7 +8798,7 @@
           <p:cNvPr id="2" name="Title 1">
             <a:extLst>
               <a:ext uri="{FF2B5EF4-FFF2-40B4-BE49-F238E27FC236}">
-                <a16:creationId xmlns:a16="http://schemas.microsoft.com/office/drawing/2014/main" id="{81CCD0A3-40EF-F958-5466-7C5AD6E9616F}"/>
+                <a16:creationId xmlns:a16="http://schemas.microsoft.com/office/drawing/2014/main" id="{F90AC1E9-0183-1982-3B35-31B07E9078AD}"/>
               </a:ext>
             </a:extLst>
           </p:cNvPr>
@@ -8363,7 +8816,7 @@
           <a:p>
             <a:r>
               <a:rPr lang="en-US" dirty="0"/>
-              <a:t>Reason why I did this analysis</a:t>
+              <a:t>Analysis technique flow chart?	</a:t>
             </a:r>
           </a:p>
         </p:txBody>
@@ -8373,7 +8826,7 @@
           <p:cNvPr id="3" name="Content Placeholder 2">
             <a:extLst>
               <a:ext uri="{FF2B5EF4-FFF2-40B4-BE49-F238E27FC236}">
-                <a16:creationId xmlns:a16="http://schemas.microsoft.com/office/drawing/2014/main" id="{B313E338-FCC9-3C03-D40D-A703E41CEB75}"/>
+                <a16:creationId xmlns:a16="http://schemas.microsoft.com/office/drawing/2014/main" id="{D75DB9AD-F70A-9FE9-CA81-9AF2D0BABE1C}"/>
               </a:ext>
             </a:extLst>
           </p:cNvPr>
@@ -8384,54 +8837,22 @@
             <p:ph idx="1"/>
           </p:nvPr>
         </p:nvSpPr>
-        <p:spPr>
-          <a:xfrm>
-            <a:off x="677334" y="1488613"/>
-            <a:ext cx="8596668" cy="3880773"/>
-          </a:xfrm>
-        </p:spPr>
+        <p:spPr/>
         <p:txBody>
           <a:bodyPr/>
           <a:lstStyle/>
           <a:p>
             <a:r>
               <a:rPr lang="en-US" dirty="0"/>
-              <a:t>Piggly wiggly on West End</a:t>
-            </a:r>
-          </a:p>
-          <a:p>
-            <a:r>
-              <a:rPr lang="en-US" dirty="0"/>
-              <a:t>Rising food costs</a:t>
-            </a:r>
-          </a:p>
-          <a:p>
-            <a:r>
-              <a:rPr lang="en-US" dirty="0"/>
-              <a:t>Nashville has less than ideal public transportation (subjective opinion)</a:t>
-            </a:r>
-          </a:p>
-          <a:p>
-            <a:r>
-              <a:rPr lang="en-US" dirty="0"/>
-              <a:t>RN with interest in public health</a:t>
-            </a:r>
-          </a:p>
-          <a:p>
-            <a:r>
-              <a:rPr lang="en-US" dirty="0"/>
-              <a:t>Everyone loves food</a:t>
-            </a:r>
-          </a:p>
-          <a:p>
-            <a:endParaRPr lang="en-US" dirty="0"/>
+              <a:t>Steps and arrows to make it look good</a:t>
+            </a:r>
           </a:p>
         </p:txBody>
       </p:sp>
     </p:spTree>
     <p:extLst>
       <p:ext uri="{BB962C8B-B14F-4D97-AF65-F5344CB8AC3E}">
-        <p14:creationId xmlns:p14="http://schemas.microsoft.com/office/powerpoint/2010/main" val="4268277911"/>
+        <p14:creationId xmlns:p14="http://schemas.microsoft.com/office/powerpoint/2010/main" val="504080362"/>
       </p:ext>
     </p:extLst>
   </p:cSld>
@@ -8463,92 +8884,6 @@
           <p:cNvPr id="2" name="Title 1">
             <a:extLst>
               <a:ext uri="{FF2B5EF4-FFF2-40B4-BE49-F238E27FC236}">
-                <a16:creationId xmlns:a16="http://schemas.microsoft.com/office/drawing/2014/main" id="{F90AC1E9-0183-1982-3B35-31B07E9078AD}"/>
-              </a:ext>
-            </a:extLst>
-          </p:cNvPr>
-          <p:cNvSpPr>
-            <a:spLocks noGrp="1"/>
-          </p:cNvSpPr>
-          <p:nvPr>
-            <p:ph type="title"/>
-          </p:nvPr>
-        </p:nvSpPr>
-        <p:spPr/>
-        <p:txBody>
-          <a:bodyPr/>
-          <a:lstStyle/>
-          <a:p>
-            <a:r>
-              <a:rPr lang="en-US" dirty="0"/>
-              <a:t>Analysis technique flow chart?	</a:t>
-            </a:r>
-          </a:p>
-        </p:txBody>
-      </p:sp>
-      <p:sp>
-        <p:nvSpPr>
-          <p:cNvPr id="3" name="Content Placeholder 2">
-            <a:extLst>
-              <a:ext uri="{FF2B5EF4-FFF2-40B4-BE49-F238E27FC236}">
-                <a16:creationId xmlns:a16="http://schemas.microsoft.com/office/drawing/2014/main" id="{D75DB9AD-F70A-9FE9-CA81-9AF2D0BABE1C}"/>
-              </a:ext>
-            </a:extLst>
-          </p:cNvPr>
-          <p:cNvSpPr>
-            <a:spLocks noGrp="1"/>
-          </p:cNvSpPr>
-          <p:nvPr>
-            <p:ph idx="1"/>
-          </p:nvPr>
-        </p:nvSpPr>
-        <p:spPr/>
-        <p:txBody>
-          <a:bodyPr/>
-          <a:lstStyle/>
-          <a:p>
-            <a:r>
-              <a:rPr lang="en-US" dirty="0"/>
-              <a:t>Steps and arrows to make it look good</a:t>
-            </a:r>
-          </a:p>
-        </p:txBody>
-      </p:sp>
-    </p:spTree>
-    <p:extLst>
-      <p:ext uri="{BB962C8B-B14F-4D97-AF65-F5344CB8AC3E}">
-        <p14:creationId xmlns:p14="http://schemas.microsoft.com/office/powerpoint/2010/main" val="504080362"/>
-      </p:ext>
-    </p:extLst>
-  </p:cSld>
-  <p:clrMapOvr>
-    <a:masterClrMapping/>
-  </p:clrMapOvr>
-</p:sld>
-</file>
-
-<file path=ppt/slides/slide7.xml><?xml version="1.0" encoding="utf-8"?>
-<p:sld xmlns:a="http://schemas.openxmlformats.org/drawingml/2006/main" xmlns:r="http://schemas.openxmlformats.org/officeDocument/2006/relationships" xmlns:p="http://schemas.openxmlformats.org/presentationml/2006/main">
-  <p:cSld>
-    <p:spTree>
-      <p:nvGrpSpPr>
-        <p:cNvPr id="1" name=""/>
-        <p:cNvGrpSpPr/>
-        <p:nvPr/>
-      </p:nvGrpSpPr>
-      <p:grpSpPr>
-        <a:xfrm>
-          <a:off x="0" y="0"/>
-          <a:ext cx="0" cy="0"/>
-          <a:chOff x="0" y="0"/>
-          <a:chExt cx="0" cy="0"/>
-        </a:xfrm>
-      </p:grpSpPr>
-      <p:sp>
-        <p:nvSpPr>
-          <p:cNvPr id="2" name="Title 1">
-            <a:extLst>
-              <a:ext uri="{FF2B5EF4-FFF2-40B4-BE49-F238E27FC236}">
                 <a16:creationId xmlns:a16="http://schemas.microsoft.com/office/drawing/2014/main" id="{B4FEE979-9D8C-2186-64E7-C33899109C30}"/>
               </a:ext>
             </a:extLst>
@@ -8588,7 +8923,12 @@
             <p:ph idx="1"/>
           </p:nvPr>
         </p:nvSpPr>
-        <p:spPr/>
+        <p:spPr>
+          <a:xfrm>
+            <a:off x="677334" y="1488613"/>
+            <a:ext cx="8596668" cy="3880773"/>
+          </a:xfrm>
+        </p:spPr>
         <p:txBody>
           <a:bodyPr/>
           <a:lstStyle/>
@@ -8661,7 +9001,7 @@
           <a:p>
             <a:r>
               <a:rPr lang="en-US" dirty="0"/>
-              <a:t>Not taking into account household income data</a:t>
+              <a:t>Does not look at household income or other census data</a:t>
             </a:r>
           </a:p>
         </p:txBody>
@@ -8679,7 +9019,7 @@
 </p:sld>
 </file>
 
-<file path=ppt/slides/slide8.xml><?xml version="1.0" encoding="utf-8"?>
+<file path=ppt/slides/slide7.xml><?xml version="1.0" encoding="utf-8"?>
 <p:sld xmlns:a="http://schemas.openxmlformats.org/drawingml/2006/main" xmlns:r="http://schemas.openxmlformats.org/officeDocument/2006/relationships" xmlns:p="http://schemas.openxmlformats.org/presentationml/2006/main">
   <p:cSld>
     <p:bg>
@@ -10256,6 +10596,90 @@
 </p:sld>
 </file>
 
+<file path=ppt/slides/slide8.xml><?xml version="1.0" encoding="utf-8"?>
+<p:sld xmlns:a="http://schemas.openxmlformats.org/drawingml/2006/main" xmlns:r="http://schemas.openxmlformats.org/officeDocument/2006/relationships" xmlns:p="http://schemas.openxmlformats.org/presentationml/2006/main">
+  <p:cSld>
+    <p:spTree>
+      <p:nvGrpSpPr>
+        <p:cNvPr id="1" name=""/>
+        <p:cNvGrpSpPr/>
+        <p:nvPr/>
+      </p:nvGrpSpPr>
+      <p:grpSpPr>
+        <a:xfrm>
+          <a:off x="0" y="0"/>
+          <a:ext cx="0" cy="0"/>
+          <a:chOff x="0" y="0"/>
+          <a:chExt cx="0" cy="0"/>
+        </a:xfrm>
+      </p:grpSpPr>
+      <p:sp>
+        <p:nvSpPr>
+          <p:cNvPr id="2" name="Title 1">
+            <a:extLst>
+              <a:ext uri="{FF2B5EF4-FFF2-40B4-BE49-F238E27FC236}">
+                <a16:creationId xmlns:a16="http://schemas.microsoft.com/office/drawing/2014/main" id="{A53EA5E4-6308-9126-C254-5D087436B290}"/>
+              </a:ext>
+            </a:extLst>
+          </p:cNvPr>
+          <p:cNvSpPr>
+            <a:spLocks noGrp="1"/>
+          </p:cNvSpPr>
+          <p:nvPr>
+            <p:ph type="title"/>
+          </p:nvPr>
+        </p:nvSpPr>
+        <p:spPr/>
+        <p:txBody>
+          <a:bodyPr/>
+          <a:lstStyle/>
+          <a:p>
+            <a:endParaRPr lang="en-US"/>
+          </a:p>
+        </p:txBody>
+      </p:sp>
+      <p:pic>
+        <p:nvPicPr>
+          <p:cNvPr id="9" name="Content Placeholder 8" descr="Chart, scatter chart&#10;&#10;Description automatically generated">
+            <a:extLst>
+              <a:ext uri="{FF2B5EF4-FFF2-40B4-BE49-F238E27FC236}">
+                <a16:creationId xmlns:a16="http://schemas.microsoft.com/office/drawing/2014/main" id="{404EF7C2-C044-2A79-D3FB-13B512599BFD}"/>
+              </a:ext>
+            </a:extLst>
+          </p:cNvPr>
+          <p:cNvPicPr>
+            <a:picLocks noGrp="1" noChangeAspect="1"/>
+          </p:cNvPicPr>
+          <p:nvPr>
+            <p:ph idx="1"/>
+          </p:nvPr>
+        </p:nvPicPr>
+        <p:blipFill>
+          <a:blip r:embed="rId3"/>
+          <a:stretch>
+            <a:fillRect/>
+          </a:stretch>
+        </p:blipFill>
+        <p:spPr>
+          <a:xfrm>
+            <a:off x="677334" y="0"/>
+            <a:ext cx="9678894" cy="6248400"/>
+          </a:xfrm>
+        </p:spPr>
+      </p:pic>
+    </p:spTree>
+    <p:extLst>
+      <p:ext uri="{BB962C8B-B14F-4D97-AF65-F5344CB8AC3E}">
+        <p14:creationId xmlns:p14="http://schemas.microsoft.com/office/powerpoint/2010/main" val="4164100762"/>
+      </p:ext>
+    </p:extLst>
+  </p:cSld>
+  <p:clrMapOvr>
+    <a:masterClrMapping/>
+  </p:clrMapOvr>
+</p:sld>
+</file>
+
 <file path=ppt/slides/slide9.xml><?xml version="1.0" encoding="utf-8"?>
 <p:sld xmlns:a="http://schemas.openxmlformats.org/drawingml/2006/main" xmlns:r="http://schemas.openxmlformats.org/officeDocument/2006/relationships" xmlns:p="http://schemas.openxmlformats.org/presentationml/2006/main">
   <p:cSld>
@@ -10278,7 +10702,7 @@
           <p:cNvPr id="2" name="Title 1">
             <a:extLst>
               <a:ext uri="{FF2B5EF4-FFF2-40B4-BE49-F238E27FC236}">
-                <a16:creationId xmlns:a16="http://schemas.microsoft.com/office/drawing/2014/main" id="{9A6A4D31-3F31-2363-64CA-25D86BF1533C}"/>
+                <a16:creationId xmlns:a16="http://schemas.microsoft.com/office/drawing/2014/main" id="{A53EA5E4-6308-9126-C254-5D087436B290}"/>
               </a:ext>
             </a:extLst>
           </p:cNvPr>
@@ -10291,29 +10715,46 @@
         </p:nvSpPr>
         <p:spPr/>
         <p:txBody>
-          <a:bodyPr>
-            <a:normAutofit fontScale="90000"/>
-          </a:bodyPr>
-          <a:lstStyle/>
-          <a:p>
-            <a:r>
-              <a:rPr lang="en-US" dirty="0"/>
-              <a:t>Why does one zip code have a total of 10 grocery stores while other zip codes only have one?</a:t>
-            </a:r>
-            <a:br>
-              <a:rPr lang="en-US" dirty="0"/>
-            </a:br>
-            <a:r>
-              <a:rPr lang="en-US" dirty="0"/>
-              <a:t>What percentage of grocery stores that one zip code accounts for</a:t>
-            </a:r>
-          </a:p>
-        </p:txBody>
-      </p:sp>
+          <a:bodyPr/>
+          <a:lstStyle/>
+          <a:p>
+            <a:endParaRPr lang="en-US"/>
+          </a:p>
+        </p:txBody>
+      </p:sp>
+      <p:pic>
+        <p:nvPicPr>
+          <p:cNvPr id="11" name="Content Placeholder 10" descr="Chart, scatter chart&#10;&#10;Description automatically generated">
+            <a:extLst>
+              <a:ext uri="{FF2B5EF4-FFF2-40B4-BE49-F238E27FC236}">
+                <a16:creationId xmlns:a16="http://schemas.microsoft.com/office/drawing/2014/main" id="{F39237DC-D43F-C614-A4E2-7EEB934F30B6}"/>
+              </a:ext>
+            </a:extLst>
+          </p:cNvPr>
+          <p:cNvPicPr>
+            <a:picLocks noGrp="1" noChangeAspect="1"/>
+          </p:cNvPicPr>
+          <p:nvPr>
+            <p:ph idx="1"/>
+          </p:nvPr>
+        </p:nvPicPr>
+        <p:blipFill>
+          <a:blip r:embed="rId2"/>
+          <a:stretch>
+            <a:fillRect/>
+          </a:stretch>
+        </p:blipFill>
+        <p:spPr>
+          <a:xfrm>
+            <a:off x="677334" y="0"/>
+            <a:ext cx="9678894" cy="6248400"/>
+          </a:xfrm>
+        </p:spPr>
+      </p:pic>
     </p:spTree>
     <p:extLst>
       <p:ext uri="{BB962C8B-B14F-4D97-AF65-F5344CB8AC3E}">
-        <p14:creationId xmlns:p14="http://schemas.microsoft.com/office/powerpoint/2010/main" val="2713106244"/>
+        <p14:creationId xmlns:p14="http://schemas.microsoft.com/office/powerpoint/2010/main" val="2117532703"/>
       </p:ext>
     </p:extLst>
   </p:cSld>

</xml_diff>

<commit_message>
polishing readme and ppt
</commit_message>
<xml_diff>
--- a/food_desert_pp.pptx
+++ b/food_desert_pp.pptx
@@ -5,7 +5,7 @@
     <p:sldMasterId id="2147483648" r:id="rId1"/>
   </p:sldMasterIdLst>
   <p:notesMasterIdLst>
-    <p:notesMasterId r:id="rId19"/>
+    <p:notesMasterId r:id="rId12"/>
   </p:notesMasterIdLst>
   <p:sldIdLst>
     <p:sldId id="256" r:id="rId2"/>
@@ -15,16 +15,9 @@
     <p:sldId id="272" r:id="rId6"/>
     <p:sldId id="268" r:id="rId7"/>
     <p:sldId id="263" r:id="rId8"/>
-    <p:sldId id="280" r:id="rId9"/>
-    <p:sldId id="281" r:id="rId10"/>
-    <p:sldId id="282" r:id="rId11"/>
-    <p:sldId id="283" r:id="rId12"/>
-    <p:sldId id="284" r:id="rId13"/>
-    <p:sldId id="285" r:id="rId14"/>
-    <p:sldId id="278" r:id="rId15"/>
-    <p:sldId id="258" r:id="rId16"/>
-    <p:sldId id="271" r:id="rId17"/>
-    <p:sldId id="279" r:id="rId18"/>
+    <p:sldId id="278" r:id="rId9"/>
+    <p:sldId id="271" r:id="rId10"/>
+    <p:sldId id="258" r:id="rId11"/>
   </p:sldIdLst>
   <p:sldSz cx="12192000" cy="6858000"/>
   <p:notesSz cx="6858000" cy="9144000"/>
@@ -559,258 +552,6 @@
 </p:notes>
 </file>
 
-<file path=ppt/notesSlides/notesSlide10.xml><?xml version="1.0" encoding="utf-8"?>
-<p:notes xmlns:a="http://schemas.openxmlformats.org/drawingml/2006/main" xmlns:r="http://schemas.openxmlformats.org/officeDocument/2006/relationships" xmlns:p="http://schemas.openxmlformats.org/presentationml/2006/main">
-  <p:cSld>
-    <p:spTree>
-      <p:nvGrpSpPr>
-        <p:cNvPr id="1" name=""/>
-        <p:cNvGrpSpPr/>
-        <p:nvPr/>
-      </p:nvGrpSpPr>
-      <p:grpSpPr>
-        <a:xfrm>
-          <a:off x="0" y="0"/>
-          <a:ext cx="0" cy="0"/>
-          <a:chOff x="0" y="0"/>
-          <a:chExt cx="0" cy="0"/>
-        </a:xfrm>
-      </p:grpSpPr>
-      <p:sp>
-        <p:nvSpPr>
-          <p:cNvPr id="2" name="Slide Image Placeholder 1"/>
-          <p:cNvSpPr>
-            <a:spLocks noGrp="1" noRot="1" noChangeAspect="1"/>
-          </p:cNvSpPr>
-          <p:nvPr>
-            <p:ph type="sldImg"/>
-          </p:nvPr>
-        </p:nvSpPr>
-        <p:spPr/>
-      </p:sp>
-      <p:sp>
-        <p:nvSpPr>
-          <p:cNvPr id="3" name="Notes Placeholder 2"/>
-          <p:cNvSpPr>
-            <a:spLocks noGrp="1"/>
-          </p:cNvSpPr>
-          <p:nvPr>
-            <p:ph type="body" idx="1"/>
-          </p:nvPr>
-        </p:nvSpPr>
-        <p:spPr/>
-        <p:txBody>
-          <a:bodyPr/>
-          <a:lstStyle/>
-          <a:p>
-            <a:endParaRPr lang="en-US" dirty="0"/>
-          </a:p>
-        </p:txBody>
-      </p:sp>
-      <p:sp>
-        <p:nvSpPr>
-          <p:cNvPr id="4" name="Slide Number Placeholder 3"/>
-          <p:cNvSpPr>
-            <a:spLocks noGrp="1"/>
-          </p:cNvSpPr>
-          <p:nvPr>
-            <p:ph type="sldNum" sz="quarter" idx="5"/>
-          </p:nvPr>
-        </p:nvSpPr>
-        <p:spPr/>
-        <p:txBody>
-          <a:bodyPr/>
-          <a:lstStyle/>
-          <a:p>
-            <a:fld id="{215B2E5D-87C1-E14D-8640-5E66DB7EFB6C}" type="slidenum">
-              <a:rPr lang="en-US" smtClean="0"/>
-              <a:t>13</a:t>
-            </a:fld>
-            <a:endParaRPr lang="en-US"/>
-          </a:p>
-        </p:txBody>
-      </p:sp>
-    </p:spTree>
-    <p:extLst>
-      <p:ext uri="{BB962C8B-B14F-4D97-AF65-F5344CB8AC3E}">
-        <p14:creationId xmlns:p14="http://schemas.microsoft.com/office/powerpoint/2010/main" val="737331624"/>
-      </p:ext>
-    </p:extLst>
-  </p:cSld>
-  <p:clrMapOvr>
-    <a:masterClrMapping/>
-  </p:clrMapOvr>
-</p:notes>
-</file>
-
-<file path=ppt/notesSlides/notesSlide11.xml><?xml version="1.0" encoding="utf-8"?>
-<p:notes xmlns:a="http://schemas.openxmlformats.org/drawingml/2006/main" xmlns:r="http://schemas.openxmlformats.org/officeDocument/2006/relationships" xmlns:p="http://schemas.openxmlformats.org/presentationml/2006/main">
-  <p:cSld>
-    <p:spTree>
-      <p:nvGrpSpPr>
-        <p:cNvPr id="1" name=""/>
-        <p:cNvGrpSpPr/>
-        <p:nvPr/>
-      </p:nvGrpSpPr>
-      <p:grpSpPr>
-        <a:xfrm>
-          <a:off x="0" y="0"/>
-          <a:ext cx="0" cy="0"/>
-          <a:chOff x="0" y="0"/>
-          <a:chExt cx="0" cy="0"/>
-        </a:xfrm>
-      </p:grpSpPr>
-      <p:sp>
-        <p:nvSpPr>
-          <p:cNvPr id="2" name="Slide Image Placeholder 1"/>
-          <p:cNvSpPr>
-            <a:spLocks noGrp="1" noRot="1" noChangeAspect="1"/>
-          </p:cNvSpPr>
-          <p:nvPr>
-            <p:ph type="sldImg"/>
-          </p:nvPr>
-        </p:nvSpPr>
-        <p:spPr/>
-      </p:sp>
-      <p:sp>
-        <p:nvSpPr>
-          <p:cNvPr id="3" name="Notes Placeholder 2"/>
-          <p:cNvSpPr>
-            <a:spLocks noGrp="1"/>
-          </p:cNvSpPr>
-          <p:nvPr>
-            <p:ph type="body" idx="1"/>
-          </p:nvPr>
-        </p:nvSpPr>
-        <p:spPr/>
-        <p:txBody>
-          <a:bodyPr/>
-          <a:lstStyle/>
-          <a:p>
-            <a:endParaRPr lang="en-US" dirty="0"/>
-          </a:p>
-        </p:txBody>
-      </p:sp>
-      <p:sp>
-        <p:nvSpPr>
-          <p:cNvPr id="4" name="Slide Number Placeholder 3"/>
-          <p:cNvSpPr>
-            <a:spLocks noGrp="1"/>
-          </p:cNvSpPr>
-          <p:nvPr>
-            <p:ph type="sldNum" sz="quarter" idx="5"/>
-          </p:nvPr>
-        </p:nvSpPr>
-        <p:spPr/>
-        <p:txBody>
-          <a:bodyPr/>
-          <a:lstStyle/>
-          <a:p>
-            <a:fld id="{215B2E5D-87C1-E14D-8640-5E66DB7EFB6C}" type="slidenum">
-              <a:rPr lang="en-US" smtClean="0"/>
-              <a:t>14</a:t>
-            </a:fld>
-            <a:endParaRPr lang="en-US"/>
-          </a:p>
-        </p:txBody>
-      </p:sp>
-    </p:spTree>
-    <p:extLst>
-      <p:ext uri="{BB962C8B-B14F-4D97-AF65-F5344CB8AC3E}">
-        <p14:creationId xmlns:p14="http://schemas.microsoft.com/office/powerpoint/2010/main" val="1561530210"/>
-      </p:ext>
-    </p:extLst>
-  </p:cSld>
-  <p:clrMapOvr>
-    <a:masterClrMapping/>
-  </p:clrMapOvr>
-</p:notes>
-</file>
-
-<file path=ppt/notesSlides/notesSlide12.xml><?xml version="1.0" encoding="utf-8"?>
-<p:notes xmlns:a="http://schemas.openxmlformats.org/drawingml/2006/main" xmlns:r="http://schemas.openxmlformats.org/officeDocument/2006/relationships" xmlns:p="http://schemas.openxmlformats.org/presentationml/2006/main">
-  <p:cSld>
-    <p:spTree>
-      <p:nvGrpSpPr>
-        <p:cNvPr id="1" name=""/>
-        <p:cNvGrpSpPr/>
-        <p:nvPr/>
-      </p:nvGrpSpPr>
-      <p:grpSpPr>
-        <a:xfrm>
-          <a:off x="0" y="0"/>
-          <a:ext cx="0" cy="0"/>
-          <a:chOff x="0" y="0"/>
-          <a:chExt cx="0" cy="0"/>
-        </a:xfrm>
-      </p:grpSpPr>
-      <p:sp>
-        <p:nvSpPr>
-          <p:cNvPr id="2" name="Slide Image Placeholder 1"/>
-          <p:cNvSpPr>
-            <a:spLocks noGrp="1" noRot="1" noChangeAspect="1"/>
-          </p:cNvSpPr>
-          <p:nvPr>
-            <p:ph type="sldImg"/>
-          </p:nvPr>
-        </p:nvSpPr>
-        <p:spPr/>
-      </p:sp>
-      <p:sp>
-        <p:nvSpPr>
-          <p:cNvPr id="3" name="Notes Placeholder 2"/>
-          <p:cNvSpPr>
-            <a:spLocks noGrp="1"/>
-          </p:cNvSpPr>
-          <p:nvPr>
-            <p:ph type="body" idx="1"/>
-          </p:nvPr>
-        </p:nvSpPr>
-        <p:spPr/>
-        <p:txBody>
-          <a:bodyPr/>
-          <a:lstStyle/>
-          <a:p>
-            <a:endParaRPr lang="en-US" dirty="0"/>
-          </a:p>
-        </p:txBody>
-      </p:sp>
-      <p:sp>
-        <p:nvSpPr>
-          <p:cNvPr id="4" name="Slide Number Placeholder 3"/>
-          <p:cNvSpPr>
-            <a:spLocks noGrp="1"/>
-          </p:cNvSpPr>
-          <p:nvPr>
-            <p:ph type="sldNum" sz="quarter" idx="5"/>
-          </p:nvPr>
-        </p:nvSpPr>
-        <p:spPr/>
-        <p:txBody>
-          <a:bodyPr/>
-          <a:lstStyle/>
-          <a:p>
-            <a:fld id="{215B2E5D-87C1-E14D-8640-5E66DB7EFB6C}" type="slidenum">
-              <a:rPr lang="en-US" smtClean="0"/>
-              <a:t>15</a:t>
-            </a:fld>
-            <a:endParaRPr lang="en-US"/>
-          </a:p>
-        </p:txBody>
-      </p:sp>
-    </p:spTree>
-    <p:extLst>
-      <p:ext uri="{BB962C8B-B14F-4D97-AF65-F5344CB8AC3E}">
-        <p14:creationId xmlns:p14="http://schemas.microsoft.com/office/powerpoint/2010/main" val="923823559"/>
-      </p:ext>
-    </p:extLst>
-  </p:cSld>
-  <p:clrMapOvr>
-    <a:masterClrMapping/>
-  </p:clrMapOvr>
-</p:notes>
-</file>
-
 <file path=ppt/notesSlides/notesSlide2.xml><?xml version="1.0" encoding="utf-8"?>
 <p:notes xmlns:a="http://schemas.openxmlformats.org/drawingml/2006/main" xmlns:r="http://schemas.openxmlformats.org/officeDocument/2006/relationships" xmlns:p="http://schemas.openxmlformats.org/presentationml/2006/main">
   <p:cSld>
@@ -1481,10 +1222,7 @@
           <a:bodyPr/>
           <a:lstStyle/>
           <a:p>
-            <a:r>
-              <a:rPr lang="en-US" dirty="0"/>
-              <a:t>Most of the following scatter plots demonstrate a weak relationship. There are some interesting findings however.</a:t>
-            </a:r>
+            <a:endParaRPr lang="en-US" dirty="0"/>
           </a:p>
         </p:txBody>
       </p:sp>
@@ -1514,7 +1252,7 @@
     </p:spTree>
     <p:extLst>
       <p:ext uri="{BB962C8B-B14F-4D97-AF65-F5344CB8AC3E}">
-        <p14:creationId xmlns:p14="http://schemas.microsoft.com/office/powerpoint/2010/main" val="1297237968"/>
+        <p14:creationId xmlns:p14="http://schemas.microsoft.com/office/powerpoint/2010/main" val="1561530210"/>
       </p:ext>
     </p:extLst>
   </p:cSld>
@@ -1598,178 +1336,7 @@
     </p:spTree>
     <p:extLst>
       <p:ext uri="{BB962C8B-B14F-4D97-AF65-F5344CB8AC3E}">
-        <p14:creationId xmlns:p14="http://schemas.microsoft.com/office/powerpoint/2010/main" val="2591177343"/>
-      </p:ext>
-    </p:extLst>
-  </p:cSld>
-  <p:clrMapOvr>
-    <a:masterClrMapping/>
-  </p:clrMapOvr>
-</p:notes>
-</file>
-
-<file path=ppt/notesSlides/notesSlide8.xml><?xml version="1.0" encoding="utf-8"?>
-<p:notes xmlns:a="http://schemas.openxmlformats.org/drawingml/2006/main" xmlns:r="http://schemas.openxmlformats.org/officeDocument/2006/relationships" xmlns:p="http://schemas.openxmlformats.org/presentationml/2006/main">
-  <p:cSld>
-    <p:spTree>
-      <p:nvGrpSpPr>
-        <p:cNvPr id="1" name=""/>
-        <p:cNvGrpSpPr/>
-        <p:nvPr/>
-      </p:nvGrpSpPr>
-      <p:grpSpPr>
-        <a:xfrm>
-          <a:off x="0" y="0"/>
-          <a:ext cx="0" cy="0"/>
-          <a:chOff x="0" y="0"/>
-          <a:chExt cx="0" cy="0"/>
-        </a:xfrm>
-      </p:grpSpPr>
-      <p:sp>
-        <p:nvSpPr>
-          <p:cNvPr id="2" name="Slide Image Placeholder 1"/>
-          <p:cNvSpPr>
-            <a:spLocks noGrp="1" noRot="1" noChangeAspect="1"/>
-          </p:cNvSpPr>
-          <p:nvPr>
-            <p:ph type="sldImg"/>
-          </p:nvPr>
-        </p:nvSpPr>
-        <p:spPr/>
-      </p:sp>
-      <p:sp>
-        <p:nvSpPr>
-          <p:cNvPr id="3" name="Notes Placeholder 2"/>
-          <p:cNvSpPr>
-            <a:spLocks noGrp="1"/>
-          </p:cNvSpPr>
-          <p:nvPr>
-            <p:ph type="body" idx="1"/>
-          </p:nvPr>
-        </p:nvSpPr>
-        <p:spPr/>
-        <p:txBody>
-          <a:bodyPr/>
-          <a:lstStyle/>
-          <a:p>
-            <a:r>
-              <a:rPr lang="en-US" dirty="0"/>
-              <a:t>High cholesterol seems to have the highest prevalence out of all diseases examined. The positive trend line works against my hypothesis however, so further analysis would benefit from looking at other metrics.</a:t>
-            </a:r>
-          </a:p>
-        </p:txBody>
-      </p:sp>
-      <p:sp>
-        <p:nvSpPr>
-          <p:cNvPr id="4" name="Slide Number Placeholder 3"/>
-          <p:cNvSpPr>
-            <a:spLocks noGrp="1"/>
-          </p:cNvSpPr>
-          <p:nvPr>
-            <p:ph type="sldNum" sz="quarter" idx="5"/>
-          </p:nvPr>
-        </p:nvSpPr>
-        <p:spPr/>
-        <p:txBody>
-          <a:bodyPr/>
-          <a:lstStyle/>
-          <a:p>
-            <a:fld id="{215B2E5D-87C1-E14D-8640-5E66DB7EFB6C}" type="slidenum">
-              <a:rPr lang="en-US" smtClean="0"/>
-              <a:t>11</a:t>
-            </a:fld>
-            <a:endParaRPr lang="en-US"/>
-          </a:p>
-        </p:txBody>
-      </p:sp>
-    </p:spTree>
-    <p:extLst>
-      <p:ext uri="{BB962C8B-B14F-4D97-AF65-F5344CB8AC3E}">
-        <p14:creationId xmlns:p14="http://schemas.microsoft.com/office/powerpoint/2010/main" val="66986011"/>
-      </p:ext>
-    </p:extLst>
-  </p:cSld>
-  <p:clrMapOvr>
-    <a:masterClrMapping/>
-  </p:clrMapOvr>
-</p:notes>
-</file>
-
-<file path=ppt/notesSlides/notesSlide9.xml><?xml version="1.0" encoding="utf-8"?>
-<p:notes xmlns:a="http://schemas.openxmlformats.org/drawingml/2006/main" xmlns:r="http://schemas.openxmlformats.org/officeDocument/2006/relationships" xmlns:p="http://schemas.openxmlformats.org/presentationml/2006/main">
-  <p:cSld>
-    <p:spTree>
-      <p:nvGrpSpPr>
-        <p:cNvPr id="1" name=""/>
-        <p:cNvGrpSpPr/>
-        <p:nvPr/>
-      </p:nvGrpSpPr>
-      <p:grpSpPr>
-        <a:xfrm>
-          <a:off x="0" y="0"/>
-          <a:ext cx="0" cy="0"/>
-          <a:chOff x="0" y="0"/>
-          <a:chExt cx="0" cy="0"/>
-        </a:xfrm>
-      </p:grpSpPr>
-      <p:sp>
-        <p:nvSpPr>
-          <p:cNvPr id="2" name="Slide Image Placeholder 1"/>
-          <p:cNvSpPr>
-            <a:spLocks noGrp="1" noRot="1" noChangeAspect="1"/>
-          </p:cNvSpPr>
-          <p:nvPr>
-            <p:ph type="sldImg"/>
-          </p:nvPr>
-        </p:nvSpPr>
-        <p:spPr/>
-      </p:sp>
-      <p:sp>
-        <p:nvSpPr>
-          <p:cNvPr id="3" name="Notes Placeholder 2"/>
-          <p:cNvSpPr>
-            <a:spLocks noGrp="1"/>
-          </p:cNvSpPr>
-          <p:nvPr>
-            <p:ph type="body" idx="1"/>
-          </p:nvPr>
-        </p:nvSpPr>
-        <p:spPr/>
-        <p:txBody>
-          <a:bodyPr/>
-          <a:lstStyle/>
-          <a:p>
-            <a:endParaRPr lang="en-US" dirty="0"/>
-          </a:p>
-        </p:txBody>
-      </p:sp>
-      <p:sp>
-        <p:nvSpPr>
-          <p:cNvPr id="4" name="Slide Number Placeholder 3"/>
-          <p:cNvSpPr>
-            <a:spLocks noGrp="1"/>
-          </p:cNvSpPr>
-          <p:nvPr>
-            <p:ph type="sldNum" sz="quarter" idx="5"/>
-          </p:nvPr>
-        </p:nvSpPr>
-        <p:spPr/>
-        <p:txBody>
-          <a:bodyPr/>
-          <a:lstStyle/>
-          <a:p>
-            <a:fld id="{215B2E5D-87C1-E14D-8640-5E66DB7EFB6C}" type="slidenum">
-              <a:rPr lang="en-US" smtClean="0"/>
-              <a:t>12</a:t>
-            </a:fld>
-            <a:endParaRPr lang="en-US"/>
-          </a:p>
-        </p:txBody>
-      </p:sp>
-    </p:spTree>
-    <p:extLst>
-      <p:ext uri="{BB962C8B-B14F-4D97-AF65-F5344CB8AC3E}">
-        <p14:creationId xmlns:p14="http://schemas.microsoft.com/office/powerpoint/2010/main" val="1106462944"/>
+        <p14:creationId xmlns:p14="http://schemas.microsoft.com/office/powerpoint/2010/main" val="923823559"/>
       </p:ext>
     </p:extLst>
   </p:cSld>
@@ -7537,412 +7104,6 @@
           <p:cNvPr id="2" name="Title 1">
             <a:extLst>
               <a:ext uri="{FF2B5EF4-FFF2-40B4-BE49-F238E27FC236}">
-                <a16:creationId xmlns:a16="http://schemas.microsoft.com/office/drawing/2014/main" id="{A53EA5E4-6308-9126-C254-5D087436B290}"/>
-              </a:ext>
-            </a:extLst>
-          </p:cNvPr>
-          <p:cNvSpPr>
-            <a:spLocks noGrp="1"/>
-          </p:cNvSpPr>
-          <p:nvPr>
-            <p:ph type="title"/>
-          </p:nvPr>
-        </p:nvSpPr>
-        <p:spPr/>
-        <p:txBody>
-          <a:bodyPr/>
-          <a:lstStyle/>
-          <a:p>
-            <a:endParaRPr lang="en-US"/>
-          </a:p>
-        </p:txBody>
-      </p:sp>
-      <p:pic>
-        <p:nvPicPr>
-          <p:cNvPr id="11" name="Content Placeholder 10" descr="Chart, scatter chart&#10;&#10;Description automatically generated">
-            <a:extLst>
-              <a:ext uri="{FF2B5EF4-FFF2-40B4-BE49-F238E27FC236}">
-                <a16:creationId xmlns:a16="http://schemas.microsoft.com/office/drawing/2014/main" id="{46E7E5FD-2B60-AA49-6321-3B69AC253189}"/>
-              </a:ext>
-            </a:extLst>
-          </p:cNvPr>
-          <p:cNvPicPr>
-            <a:picLocks noGrp="1" noChangeAspect="1"/>
-          </p:cNvPicPr>
-          <p:nvPr>
-            <p:ph idx="1"/>
-          </p:nvPr>
-        </p:nvPicPr>
-        <p:blipFill>
-          <a:blip r:embed="rId3"/>
-          <a:stretch>
-            <a:fillRect/>
-          </a:stretch>
-        </p:blipFill>
-        <p:spPr>
-          <a:xfrm>
-            <a:off x="609879" y="0"/>
-            <a:ext cx="9678894" cy="6248400"/>
-          </a:xfrm>
-        </p:spPr>
-      </p:pic>
-    </p:spTree>
-    <p:extLst>
-      <p:ext uri="{BB962C8B-B14F-4D97-AF65-F5344CB8AC3E}">
-        <p14:creationId xmlns:p14="http://schemas.microsoft.com/office/powerpoint/2010/main" val="499009756"/>
-      </p:ext>
-    </p:extLst>
-  </p:cSld>
-  <p:clrMapOvr>
-    <a:masterClrMapping/>
-  </p:clrMapOvr>
-</p:sld>
-</file>
-
-<file path=ppt/slides/slide11.xml><?xml version="1.0" encoding="utf-8"?>
-<p:sld xmlns:a="http://schemas.openxmlformats.org/drawingml/2006/main" xmlns:r="http://schemas.openxmlformats.org/officeDocument/2006/relationships" xmlns:p="http://schemas.openxmlformats.org/presentationml/2006/main">
-  <p:cSld>
-    <p:spTree>
-      <p:nvGrpSpPr>
-        <p:cNvPr id="1" name=""/>
-        <p:cNvGrpSpPr/>
-        <p:nvPr/>
-      </p:nvGrpSpPr>
-      <p:grpSpPr>
-        <a:xfrm>
-          <a:off x="0" y="0"/>
-          <a:ext cx="0" cy="0"/>
-          <a:chOff x="0" y="0"/>
-          <a:chExt cx="0" cy="0"/>
-        </a:xfrm>
-      </p:grpSpPr>
-      <p:sp>
-        <p:nvSpPr>
-          <p:cNvPr id="2" name="Title 1">
-            <a:extLst>
-              <a:ext uri="{FF2B5EF4-FFF2-40B4-BE49-F238E27FC236}">
-                <a16:creationId xmlns:a16="http://schemas.microsoft.com/office/drawing/2014/main" id="{A53EA5E4-6308-9126-C254-5D087436B290}"/>
-              </a:ext>
-            </a:extLst>
-          </p:cNvPr>
-          <p:cNvSpPr>
-            <a:spLocks noGrp="1"/>
-          </p:cNvSpPr>
-          <p:nvPr>
-            <p:ph type="title"/>
-          </p:nvPr>
-        </p:nvSpPr>
-        <p:spPr/>
-        <p:txBody>
-          <a:bodyPr/>
-          <a:lstStyle/>
-          <a:p>
-            <a:endParaRPr lang="en-US"/>
-          </a:p>
-        </p:txBody>
-      </p:sp>
-      <p:pic>
-        <p:nvPicPr>
-          <p:cNvPr id="11" name="Content Placeholder 10" descr="Chart, scatter chart&#10;&#10;Description automatically generated">
-            <a:extLst>
-              <a:ext uri="{FF2B5EF4-FFF2-40B4-BE49-F238E27FC236}">
-                <a16:creationId xmlns:a16="http://schemas.microsoft.com/office/drawing/2014/main" id="{5C51C8C3-D9DF-B98F-030D-0706C49F3F5B}"/>
-              </a:ext>
-            </a:extLst>
-          </p:cNvPr>
-          <p:cNvPicPr>
-            <a:picLocks noGrp="1" noChangeAspect="1"/>
-          </p:cNvPicPr>
-          <p:nvPr>
-            <p:ph idx="1"/>
-          </p:nvPr>
-        </p:nvPicPr>
-        <p:blipFill>
-          <a:blip r:embed="rId3"/>
-          <a:stretch>
-            <a:fillRect/>
-          </a:stretch>
-        </p:blipFill>
-        <p:spPr>
-          <a:xfrm>
-            <a:off x="617374" y="0"/>
-            <a:ext cx="9678894" cy="6248400"/>
-          </a:xfrm>
-        </p:spPr>
-      </p:pic>
-    </p:spTree>
-    <p:extLst>
-      <p:ext uri="{BB962C8B-B14F-4D97-AF65-F5344CB8AC3E}">
-        <p14:creationId xmlns:p14="http://schemas.microsoft.com/office/powerpoint/2010/main" val="502227334"/>
-      </p:ext>
-    </p:extLst>
-  </p:cSld>
-  <p:clrMapOvr>
-    <a:masterClrMapping/>
-  </p:clrMapOvr>
-</p:sld>
-</file>
-
-<file path=ppt/slides/slide12.xml><?xml version="1.0" encoding="utf-8"?>
-<p:sld xmlns:a="http://schemas.openxmlformats.org/drawingml/2006/main" xmlns:r="http://schemas.openxmlformats.org/officeDocument/2006/relationships" xmlns:p="http://schemas.openxmlformats.org/presentationml/2006/main">
-  <p:cSld>
-    <p:spTree>
-      <p:nvGrpSpPr>
-        <p:cNvPr id="1" name=""/>
-        <p:cNvGrpSpPr/>
-        <p:nvPr/>
-      </p:nvGrpSpPr>
-      <p:grpSpPr>
-        <a:xfrm>
-          <a:off x="0" y="0"/>
-          <a:ext cx="0" cy="0"/>
-          <a:chOff x="0" y="0"/>
-          <a:chExt cx="0" cy="0"/>
-        </a:xfrm>
-      </p:grpSpPr>
-      <p:sp>
-        <p:nvSpPr>
-          <p:cNvPr id="2" name="Title 1">
-            <a:extLst>
-              <a:ext uri="{FF2B5EF4-FFF2-40B4-BE49-F238E27FC236}">
-                <a16:creationId xmlns:a16="http://schemas.microsoft.com/office/drawing/2014/main" id="{A53EA5E4-6308-9126-C254-5D087436B290}"/>
-              </a:ext>
-            </a:extLst>
-          </p:cNvPr>
-          <p:cNvSpPr>
-            <a:spLocks noGrp="1"/>
-          </p:cNvSpPr>
-          <p:nvPr>
-            <p:ph type="title"/>
-          </p:nvPr>
-        </p:nvSpPr>
-        <p:spPr/>
-        <p:txBody>
-          <a:bodyPr/>
-          <a:lstStyle/>
-          <a:p>
-            <a:endParaRPr lang="en-US"/>
-          </a:p>
-        </p:txBody>
-      </p:sp>
-      <p:pic>
-        <p:nvPicPr>
-          <p:cNvPr id="11" name="Content Placeholder 10" descr="Chart, scatter chart&#10;&#10;Description automatically generated">
-            <a:extLst>
-              <a:ext uri="{FF2B5EF4-FFF2-40B4-BE49-F238E27FC236}">
-                <a16:creationId xmlns:a16="http://schemas.microsoft.com/office/drawing/2014/main" id="{B9720362-136D-9DAE-E66A-CC2E7391DB9F}"/>
-              </a:ext>
-            </a:extLst>
-          </p:cNvPr>
-          <p:cNvPicPr>
-            <a:picLocks noGrp="1" noChangeAspect="1"/>
-          </p:cNvPicPr>
-          <p:nvPr>
-            <p:ph idx="1"/>
-          </p:nvPr>
-        </p:nvPicPr>
-        <p:blipFill>
-          <a:blip r:embed="rId3"/>
-          <a:stretch>
-            <a:fillRect/>
-          </a:stretch>
-        </p:blipFill>
-        <p:spPr>
-          <a:xfrm>
-            <a:off x="617374" y="0"/>
-            <a:ext cx="9678894" cy="6248400"/>
-          </a:xfrm>
-        </p:spPr>
-      </p:pic>
-    </p:spTree>
-    <p:extLst>
-      <p:ext uri="{BB962C8B-B14F-4D97-AF65-F5344CB8AC3E}">
-        <p14:creationId xmlns:p14="http://schemas.microsoft.com/office/powerpoint/2010/main" val="3473258192"/>
-      </p:ext>
-    </p:extLst>
-  </p:cSld>
-  <p:clrMapOvr>
-    <a:masterClrMapping/>
-  </p:clrMapOvr>
-</p:sld>
-</file>
-
-<file path=ppt/slides/slide13.xml><?xml version="1.0" encoding="utf-8"?>
-<p:sld xmlns:a="http://schemas.openxmlformats.org/drawingml/2006/main" xmlns:r="http://schemas.openxmlformats.org/officeDocument/2006/relationships" xmlns:p="http://schemas.openxmlformats.org/presentationml/2006/main">
-  <p:cSld>
-    <p:spTree>
-      <p:nvGrpSpPr>
-        <p:cNvPr id="1" name=""/>
-        <p:cNvGrpSpPr/>
-        <p:nvPr/>
-      </p:nvGrpSpPr>
-      <p:grpSpPr>
-        <a:xfrm>
-          <a:off x="0" y="0"/>
-          <a:ext cx="0" cy="0"/>
-          <a:chOff x="0" y="0"/>
-          <a:chExt cx="0" cy="0"/>
-        </a:xfrm>
-      </p:grpSpPr>
-      <p:sp>
-        <p:nvSpPr>
-          <p:cNvPr id="2" name="Title 1">
-            <a:extLst>
-              <a:ext uri="{FF2B5EF4-FFF2-40B4-BE49-F238E27FC236}">
-                <a16:creationId xmlns:a16="http://schemas.microsoft.com/office/drawing/2014/main" id="{A53EA5E4-6308-9126-C254-5D087436B290}"/>
-              </a:ext>
-            </a:extLst>
-          </p:cNvPr>
-          <p:cNvSpPr>
-            <a:spLocks noGrp="1"/>
-          </p:cNvSpPr>
-          <p:nvPr>
-            <p:ph type="title"/>
-          </p:nvPr>
-        </p:nvSpPr>
-        <p:spPr/>
-        <p:txBody>
-          <a:bodyPr/>
-          <a:lstStyle/>
-          <a:p>
-            <a:endParaRPr lang="en-US"/>
-          </a:p>
-        </p:txBody>
-      </p:sp>
-      <p:pic>
-        <p:nvPicPr>
-          <p:cNvPr id="11" name="Content Placeholder 10" descr="Chart, scatter chart&#10;&#10;Description automatically generated">
-            <a:extLst>
-              <a:ext uri="{FF2B5EF4-FFF2-40B4-BE49-F238E27FC236}">
-                <a16:creationId xmlns:a16="http://schemas.microsoft.com/office/drawing/2014/main" id="{78575FAF-3051-4771-D428-279A106357FB}"/>
-              </a:ext>
-            </a:extLst>
-          </p:cNvPr>
-          <p:cNvPicPr>
-            <a:picLocks noGrp="1" noChangeAspect="1"/>
-          </p:cNvPicPr>
-          <p:nvPr>
-            <p:ph idx="1"/>
-          </p:nvPr>
-        </p:nvPicPr>
-        <p:blipFill>
-          <a:blip r:embed="rId3"/>
-          <a:stretch>
-            <a:fillRect/>
-          </a:stretch>
-        </p:blipFill>
-        <p:spPr>
-          <a:xfrm>
-            <a:off x="609878" y="0"/>
-            <a:ext cx="9678894" cy="6248400"/>
-          </a:xfrm>
-        </p:spPr>
-      </p:pic>
-    </p:spTree>
-    <p:extLst>
-      <p:ext uri="{BB962C8B-B14F-4D97-AF65-F5344CB8AC3E}">
-        <p14:creationId xmlns:p14="http://schemas.microsoft.com/office/powerpoint/2010/main" val="3012565670"/>
-      </p:ext>
-    </p:extLst>
-  </p:cSld>
-  <p:clrMapOvr>
-    <a:masterClrMapping/>
-  </p:clrMapOvr>
-</p:sld>
-</file>
-
-<file path=ppt/slides/slide14.xml><?xml version="1.0" encoding="utf-8"?>
-<p:sld xmlns:a="http://schemas.openxmlformats.org/drawingml/2006/main" xmlns:r="http://schemas.openxmlformats.org/officeDocument/2006/relationships" xmlns:p="http://schemas.openxmlformats.org/presentationml/2006/main">
-  <p:cSld>
-    <p:spTree>
-      <p:nvGrpSpPr>
-        <p:cNvPr id="1" name=""/>
-        <p:cNvGrpSpPr/>
-        <p:nvPr/>
-      </p:nvGrpSpPr>
-      <p:grpSpPr>
-        <a:xfrm>
-          <a:off x="0" y="0"/>
-          <a:ext cx="0" cy="0"/>
-          <a:chOff x="0" y="0"/>
-          <a:chExt cx="0" cy="0"/>
-        </a:xfrm>
-      </p:grpSpPr>
-      <p:sp>
-        <p:nvSpPr>
-          <p:cNvPr id="2" name="Title 1">
-            <a:extLst>
-              <a:ext uri="{FF2B5EF4-FFF2-40B4-BE49-F238E27FC236}">
-                <a16:creationId xmlns:a16="http://schemas.microsoft.com/office/drawing/2014/main" id="{9A6A4D31-3F31-2363-64CA-25D86BF1533C}"/>
-              </a:ext>
-            </a:extLst>
-          </p:cNvPr>
-          <p:cNvSpPr>
-            <a:spLocks noGrp="1"/>
-          </p:cNvSpPr>
-          <p:nvPr>
-            <p:ph type="title"/>
-          </p:nvPr>
-        </p:nvSpPr>
-        <p:spPr/>
-        <p:txBody>
-          <a:bodyPr>
-            <a:normAutofit fontScale="90000"/>
-          </a:bodyPr>
-          <a:lstStyle/>
-          <a:p>
-            <a:r>
-              <a:rPr lang="en-US" dirty="0"/>
-              <a:t>Why does one zip code have a total of 9 grocery stores while other zip codes only have one?</a:t>
-            </a:r>
-            <a:br>
-              <a:rPr lang="en-US" dirty="0"/>
-            </a:br>
-            <a:br>
-              <a:rPr lang="en-US" dirty="0"/>
-            </a:br>
-            <a:r>
-              <a:rPr lang="en-US" dirty="0"/>
-              <a:t>What percentage of grocery stores that one zip code accounts for</a:t>
-            </a:r>
-          </a:p>
-        </p:txBody>
-      </p:sp>
-    </p:spTree>
-    <p:extLst>
-      <p:ext uri="{BB962C8B-B14F-4D97-AF65-F5344CB8AC3E}">
-        <p14:creationId xmlns:p14="http://schemas.microsoft.com/office/powerpoint/2010/main" val="2713106244"/>
-      </p:ext>
-    </p:extLst>
-  </p:cSld>
-  <p:clrMapOvr>
-    <a:masterClrMapping/>
-  </p:clrMapOvr>
-</p:sld>
-</file>
-
-<file path=ppt/slides/slide15.xml><?xml version="1.0" encoding="utf-8"?>
-<p:sld xmlns:a="http://schemas.openxmlformats.org/drawingml/2006/main" xmlns:r="http://schemas.openxmlformats.org/officeDocument/2006/relationships" xmlns:p="http://schemas.openxmlformats.org/presentationml/2006/main">
-  <p:cSld>
-    <p:spTree>
-      <p:nvGrpSpPr>
-        <p:cNvPr id="1" name=""/>
-        <p:cNvGrpSpPr/>
-        <p:nvPr/>
-      </p:nvGrpSpPr>
-      <p:grpSpPr>
-        <a:xfrm>
-          <a:off x="0" y="0"/>
-          <a:ext cx="0" cy="0"/>
-          <a:chOff x="0" y="0"/>
-          <a:chExt cx="0" cy="0"/>
-        </a:xfrm>
-      </p:grpSpPr>
-      <p:sp>
-        <p:nvSpPr>
-          <p:cNvPr id="2" name="Title 1">
-            <a:extLst>
-              <a:ext uri="{FF2B5EF4-FFF2-40B4-BE49-F238E27FC236}">
                 <a16:creationId xmlns:a16="http://schemas.microsoft.com/office/drawing/2014/main" id="{EE939CEF-D313-650F-CDED-D901767987C6}"/>
               </a:ext>
             </a:extLst>
@@ -8141,137 +7302,6 @@
     <p:extLst>
       <p:ext uri="{BB962C8B-B14F-4D97-AF65-F5344CB8AC3E}">
         <p14:creationId xmlns:p14="http://schemas.microsoft.com/office/powerpoint/2010/main" val="2084559206"/>
-      </p:ext>
-    </p:extLst>
-  </p:cSld>
-  <p:clrMapOvr>
-    <a:masterClrMapping/>
-  </p:clrMapOvr>
-</p:sld>
-</file>
-
-<file path=ppt/slides/slide16.xml><?xml version="1.0" encoding="utf-8"?>
-<p:sld xmlns:a="http://schemas.openxmlformats.org/drawingml/2006/main" xmlns:r="http://schemas.openxmlformats.org/officeDocument/2006/relationships" xmlns:p="http://schemas.openxmlformats.org/presentationml/2006/main">
-  <p:cSld>
-    <p:spTree>
-      <p:nvGrpSpPr>
-        <p:cNvPr id="1" name=""/>
-        <p:cNvGrpSpPr/>
-        <p:nvPr/>
-      </p:nvGrpSpPr>
-      <p:grpSpPr>
-        <a:xfrm>
-          <a:off x="0" y="0"/>
-          <a:ext cx="0" cy="0"/>
-          <a:chOff x="0" y="0"/>
-          <a:chExt cx="0" cy="0"/>
-        </a:xfrm>
-      </p:grpSpPr>
-      <p:sp>
-        <p:nvSpPr>
-          <p:cNvPr id="2" name="Title 1">
-            <a:extLst>
-              <a:ext uri="{FF2B5EF4-FFF2-40B4-BE49-F238E27FC236}">
-                <a16:creationId xmlns:a16="http://schemas.microsoft.com/office/drawing/2014/main" id="{F93A99E5-7A26-54F0-7699-063A5CE75FA6}"/>
-              </a:ext>
-            </a:extLst>
-          </p:cNvPr>
-          <p:cNvSpPr>
-            <a:spLocks noGrp="1"/>
-          </p:cNvSpPr>
-          <p:nvPr>
-            <p:ph type="title"/>
-          </p:nvPr>
-        </p:nvSpPr>
-        <p:spPr>
-          <a:xfrm>
-            <a:off x="1797666" y="2768600"/>
-            <a:ext cx="8596668" cy="1320800"/>
-          </a:xfrm>
-        </p:spPr>
-        <p:txBody>
-          <a:bodyPr/>
-          <a:lstStyle/>
-          <a:p>
-            <a:pPr algn="ctr"/>
-            <a:r>
-              <a:rPr lang="en-US" dirty="0"/>
-              <a:t>Questions?</a:t>
-            </a:r>
-          </a:p>
-        </p:txBody>
-      </p:sp>
-    </p:spTree>
-    <p:extLst>
-      <p:ext uri="{BB962C8B-B14F-4D97-AF65-F5344CB8AC3E}">
-        <p14:creationId xmlns:p14="http://schemas.microsoft.com/office/powerpoint/2010/main" val="4170679358"/>
-      </p:ext>
-    </p:extLst>
-  </p:cSld>
-  <p:clrMapOvr>
-    <a:masterClrMapping/>
-  </p:clrMapOvr>
-</p:sld>
-</file>
-
-<file path=ppt/slides/slide17.xml><?xml version="1.0" encoding="utf-8"?>
-<p:sld xmlns:a="http://schemas.openxmlformats.org/drawingml/2006/main" xmlns:r="http://schemas.openxmlformats.org/officeDocument/2006/relationships" xmlns:p="http://schemas.openxmlformats.org/presentationml/2006/main">
-  <p:cSld>
-    <p:spTree>
-      <p:nvGrpSpPr>
-        <p:cNvPr id="1" name=""/>
-        <p:cNvGrpSpPr/>
-        <p:nvPr/>
-      </p:nvGrpSpPr>
-      <p:grpSpPr>
-        <a:xfrm>
-          <a:off x="0" y="0"/>
-          <a:ext cx="0" cy="0"/>
-          <a:chOff x="0" y="0"/>
-          <a:chExt cx="0" cy="0"/>
-        </a:xfrm>
-      </p:grpSpPr>
-      <p:sp>
-        <p:nvSpPr>
-          <p:cNvPr id="2" name="Title 1">
-            <a:extLst>
-              <a:ext uri="{FF2B5EF4-FFF2-40B4-BE49-F238E27FC236}">
-                <a16:creationId xmlns:a16="http://schemas.microsoft.com/office/drawing/2014/main" id="{1F814D6E-00AA-775A-FF50-94D7BE631017}"/>
-              </a:ext>
-            </a:extLst>
-          </p:cNvPr>
-          <p:cNvSpPr>
-            <a:spLocks noGrp="1"/>
-          </p:cNvSpPr>
-          <p:nvPr>
-            <p:ph type="title"/>
-          </p:nvPr>
-        </p:nvSpPr>
-        <p:spPr>
-          <a:xfrm>
-            <a:off x="1797666" y="2768600"/>
-            <a:ext cx="8596668" cy="1320800"/>
-          </a:xfrm>
-        </p:spPr>
-        <p:txBody>
-          <a:bodyPr/>
-          <a:lstStyle/>
-          <a:p>
-            <a:pPr algn="ctr"/>
-            <a:r>
-              <a:rPr lang="en-US" dirty="0">
-                <a:hlinkClick r:id="rId2"/>
-              </a:rPr>
-              <a:t>Off to the dashboard!</a:t>
-            </a:r>
-            <a:endParaRPr lang="en-US" dirty="0"/>
-          </a:p>
-        </p:txBody>
-      </p:sp>
-    </p:spTree>
-    <p:extLst>
-      <p:ext uri="{BB962C8B-B14F-4D97-AF65-F5344CB8AC3E}">
-        <p14:creationId xmlns:p14="http://schemas.microsoft.com/office/powerpoint/2010/main" val="2207471357"/>
       </p:ext>
     </p:extLst>
   </p:cSld>
@@ -9858,9 +8888,12 @@
           <a:p>
             <a:pPr algn="r"/>
             <a:r>
-              <a:rPr lang="en-US" sz="4800" dirty="0"/>
+              <a:rPr lang="en-US" sz="4800" dirty="0">
+                <a:hlinkClick r:id="rId3"/>
+              </a:rPr>
               <a:t>Impact on Nashville</a:t>
             </a:r>
+            <a:endParaRPr lang="en-US" sz="4800" dirty="0"/>
           </a:p>
         </p:txBody>
       </p:sp>
@@ -10618,7 +9651,7 @@
           <p:cNvPr id="2" name="Title 1">
             <a:extLst>
               <a:ext uri="{FF2B5EF4-FFF2-40B4-BE49-F238E27FC236}">
-                <a16:creationId xmlns:a16="http://schemas.microsoft.com/office/drawing/2014/main" id="{A53EA5E4-6308-9126-C254-5D087436B290}"/>
+                <a16:creationId xmlns:a16="http://schemas.microsoft.com/office/drawing/2014/main" id="{9A6A4D31-3F31-2363-64CA-25D86BF1533C}"/>
               </a:ext>
             </a:extLst>
           </p:cNvPr>
@@ -10631,46 +9664,32 @@
         </p:nvSpPr>
         <p:spPr/>
         <p:txBody>
-          <a:bodyPr/>
+          <a:bodyPr>
+            <a:normAutofit fontScale="90000"/>
+          </a:bodyPr>
           <a:lstStyle/>
           <a:p>
-            <a:endParaRPr lang="en-US"/>
-          </a:p>
-        </p:txBody>
-      </p:sp>
-      <p:pic>
-        <p:nvPicPr>
-          <p:cNvPr id="9" name="Content Placeholder 8" descr="Chart, scatter chart&#10;&#10;Description automatically generated">
-            <a:extLst>
-              <a:ext uri="{FF2B5EF4-FFF2-40B4-BE49-F238E27FC236}">
-                <a16:creationId xmlns:a16="http://schemas.microsoft.com/office/drawing/2014/main" id="{404EF7C2-C044-2A79-D3FB-13B512599BFD}"/>
-              </a:ext>
-            </a:extLst>
-          </p:cNvPr>
-          <p:cNvPicPr>
-            <a:picLocks noGrp="1" noChangeAspect="1"/>
-          </p:cNvPicPr>
-          <p:nvPr>
-            <p:ph idx="1"/>
-          </p:nvPr>
-        </p:nvPicPr>
-        <p:blipFill>
-          <a:blip r:embed="rId3"/>
-          <a:stretch>
-            <a:fillRect/>
-          </a:stretch>
-        </p:blipFill>
-        <p:spPr>
-          <a:xfrm>
-            <a:off x="602384" y="0"/>
-            <a:ext cx="9678894" cy="6248400"/>
-          </a:xfrm>
-        </p:spPr>
-      </p:pic>
+            <a:r>
+              <a:rPr lang="en-US" dirty="0"/>
+              <a:t>Why does one zip code have a total of 9 grocery stores while other zip codes only have one?</a:t>
+            </a:r>
+            <a:br>
+              <a:rPr lang="en-US" dirty="0"/>
+            </a:br>
+            <a:br>
+              <a:rPr lang="en-US" dirty="0"/>
+            </a:br>
+            <a:r>
+              <a:rPr lang="en-US" dirty="0"/>
+              <a:t>What percentage of grocery stores that one zip code accounts for</a:t>
+            </a:r>
+          </a:p>
+        </p:txBody>
+      </p:sp>
     </p:spTree>
     <p:extLst>
       <p:ext uri="{BB962C8B-B14F-4D97-AF65-F5344CB8AC3E}">
-        <p14:creationId xmlns:p14="http://schemas.microsoft.com/office/powerpoint/2010/main" val="4164100762"/>
+        <p14:creationId xmlns:p14="http://schemas.microsoft.com/office/powerpoint/2010/main" val="2713106244"/>
       </p:ext>
     </p:extLst>
   </p:cSld>
@@ -10702,7 +9721,7 @@
           <p:cNvPr id="2" name="Title 1">
             <a:extLst>
               <a:ext uri="{FF2B5EF4-FFF2-40B4-BE49-F238E27FC236}">
-                <a16:creationId xmlns:a16="http://schemas.microsoft.com/office/drawing/2014/main" id="{A53EA5E4-6308-9126-C254-5D087436B290}"/>
+                <a16:creationId xmlns:a16="http://schemas.microsoft.com/office/drawing/2014/main" id="{F93A99E5-7A26-54F0-7699-063A5CE75FA6}"/>
               </a:ext>
             </a:extLst>
           </p:cNvPr>
@@ -10713,48 +9732,28 @@
             <p:ph type="title"/>
           </p:nvPr>
         </p:nvSpPr>
-        <p:spPr/>
+        <p:spPr>
+          <a:xfrm>
+            <a:off x="1797666" y="2768600"/>
+            <a:ext cx="8596668" cy="1320800"/>
+          </a:xfrm>
+        </p:spPr>
         <p:txBody>
           <a:bodyPr/>
           <a:lstStyle/>
           <a:p>
-            <a:endParaRPr lang="en-US"/>
-          </a:p>
-        </p:txBody>
-      </p:sp>
-      <p:pic>
-        <p:nvPicPr>
-          <p:cNvPr id="11" name="Content Placeholder 10" descr="Chart, scatter chart&#10;&#10;Description automatically generated">
-            <a:extLst>
-              <a:ext uri="{FF2B5EF4-FFF2-40B4-BE49-F238E27FC236}">
-                <a16:creationId xmlns:a16="http://schemas.microsoft.com/office/drawing/2014/main" id="{F39237DC-D43F-C614-A4E2-7EEB934F30B6}"/>
-              </a:ext>
-            </a:extLst>
-          </p:cNvPr>
-          <p:cNvPicPr>
-            <a:picLocks noGrp="1" noChangeAspect="1"/>
-          </p:cNvPicPr>
-          <p:nvPr>
-            <p:ph idx="1"/>
-          </p:nvPr>
-        </p:nvPicPr>
-        <p:blipFill>
-          <a:blip r:embed="rId2"/>
-          <a:stretch>
-            <a:fillRect/>
-          </a:stretch>
-        </p:blipFill>
-        <p:spPr>
-          <a:xfrm>
-            <a:off x="609879" y="0"/>
-            <a:ext cx="9678894" cy="6248400"/>
-          </a:xfrm>
-        </p:spPr>
-      </p:pic>
+            <a:pPr algn="ctr"/>
+            <a:r>
+              <a:rPr lang="en-US" dirty="0"/>
+              <a:t>Questions?</a:t>
+            </a:r>
+          </a:p>
+        </p:txBody>
+      </p:sp>
     </p:spTree>
     <p:extLst>
       <p:ext uri="{BB962C8B-B14F-4D97-AF65-F5344CB8AC3E}">
-        <p14:creationId xmlns:p14="http://schemas.microsoft.com/office/powerpoint/2010/main" val="2117532703"/>
+        <p14:creationId xmlns:p14="http://schemas.microsoft.com/office/powerpoint/2010/main" val="4170679358"/>
       </p:ext>
     </p:extLst>
   </p:cSld>

</xml_diff>